<commit_message>
[Doc][Misc] Updated presentation in section 'Vision'
</commit_message>
<xml_diff>
--- a/Documentation/Presentation/midterm_se.pptx
+++ b/Documentation/Presentation/midterm_se.pptx
@@ -5,27 +5,29 @@
     <p:sldMasterId id="2147483678" r:id="rId1"/>
   </p:sldMasterIdLst>
   <p:notesMasterIdLst>
-    <p:notesMasterId r:id="rId20"/>
+    <p:notesMasterId r:id="rId22"/>
   </p:notesMasterIdLst>
   <p:sldIdLst>
     <p:sldId id="256" r:id="rId2"/>
     <p:sldId id="276" r:id="rId3"/>
     <p:sldId id="257" r:id="rId4"/>
-    <p:sldId id="258" r:id="rId5"/>
-    <p:sldId id="260" r:id="rId6"/>
-    <p:sldId id="275" r:id="rId7"/>
-    <p:sldId id="262" r:id="rId8"/>
-    <p:sldId id="272" r:id="rId9"/>
-    <p:sldId id="277" r:id="rId10"/>
-    <p:sldId id="271" r:id="rId11"/>
-    <p:sldId id="265" r:id="rId12"/>
-    <p:sldId id="278" r:id="rId13"/>
-    <p:sldId id="261" r:id="rId14"/>
-    <p:sldId id="268" r:id="rId15"/>
-    <p:sldId id="273" r:id="rId16"/>
-    <p:sldId id="274" r:id="rId17"/>
-    <p:sldId id="269" r:id="rId18"/>
-    <p:sldId id="270" r:id="rId19"/>
+    <p:sldId id="280" r:id="rId5"/>
+    <p:sldId id="279" r:id="rId6"/>
+    <p:sldId id="258" r:id="rId7"/>
+    <p:sldId id="260" r:id="rId8"/>
+    <p:sldId id="275" r:id="rId9"/>
+    <p:sldId id="262" r:id="rId10"/>
+    <p:sldId id="272" r:id="rId11"/>
+    <p:sldId id="277" r:id="rId12"/>
+    <p:sldId id="271" r:id="rId13"/>
+    <p:sldId id="265" r:id="rId14"/>
+    <p:sldId id="278" r:id="rId15"/>
+    <p:sldId id="261" r:id="rId16"/>
+    <p:sldId id="268" r:id="rId17"/>
+    <p:sldId id="273" r:id="rId18"/>
+    <p:sldId id="274" r:id="rId19"/>
+    <p:sldId id="269" r:id="rId20"/>
+    <p:sldId id="270" r:id="rId21"/>
   </p:sldIdLst>
   <p:sldSz cx="12192000" cy="6858000"/>
   <p:notesSz cx="6858000" cy="9144000"/>
@@ -135,6 +137,116 @@
 <file path=ppt/changesInfos/changesInfo1.xml><?xml version="1.0" encoding="utf-8"?>
 <pc:chgInfo xmlns:a="http://schemas.openxmlformats.org/drawingml/2006/main" xmlns:r="http://schemas.openxmlformats.org/officeDocument/2006/relationships" xmlns:ac="http://schemas.microsoft.com/office/drawing/2013/main/command" xmlns:pc="http://schemas.microsoft.com/office/powerpoint/2013/main/command">
   <pc:docChgLst>
+    <pc:chgData name="Adam, Jannik" userId="209b27c2-fcda-416a-8b1d-a83d71372b3b" providerId="ADAL" clId="{215F5312-CD1D-4533-8BA6-96026F56AC75}"/>
+    <pc:docChg chg="custSel addSld modSld">
+      <pc:chgData name="Adam, Jannik" userId="209b27c2-fcda-416a-8b1d-a83d71372b3b" providerId="ADAL" clId="{215F5312-CD1D-4533-8BA6-96026F56AC75}" dt="2018-12-11T10:39:42.778" v="565" actId="20577"/>
+      <pc:docMkLst>
+        <pc:docMk/>
+      </pc:docMkLst>
+      <pc:sldChg chg="modSp">
+        <pc:chgData name="Adam, Jannik" userId="209b27c2-fcda-416a-8b1d-a83d71372b3b" providerId="ADAL" clId="{215F5312-CD1D-4533-8BA6-96026F56AC75}" dt="2018-12-11T10:35:24.448" v="483"/>
+        <pc:sldMkLst>
+          <pc:docMk/>
+          <pc:sldMk cId="1231455508" sldId="257"/>
+        </pc:sldMkLst>
+        <pc:spChg chg="mod">
+          <ac:chgData name="Adam, Jannik" userId="209b27c2-fcda-416a-8b1d-a83d71372b3b" providerId="ADAL" clId="{215F5312-CD1D-4533-8BA6-96026F56AC75}" dt="2018-12-11T09:52:54.213" v="3" actId="20577"/>
+          <ac:spMkLst>
+            <pc:docMk/>
+            <pc:sldMk cId="1231455508" sldId="257"/>
+            <ac:spMk id="2" creationId="{C9D08F30-42E6-428D-B431-908D99B7D1C0}"/>
+          </ac:spMkLst>
+        </pc:spChg>
+        <pc:spChg chg="mod">
+          <ac:chgData name="Adam, Jannik" userId="209b27c2-fcda-416a-8b1d-a83d71372b3b" providerId="ADAL" clId="{215F5312-CD1D-4533-8BA6-96026F56AC75}" dt="2018-12-11T10:35:24.448" v="483"/>
+          <ac:spMkLst>
+            <pc:docMk/>
+            <pc:sldMk cId="1231455508" sldId="257"/>
+            <ac:spMk id="3" creationId="{59C0C4E5-9732-40D9-AEA4-E13A2A3288B0}"/>
+          </ac:spMkLst>
+        </pc:spChg>
+      </pc:sldChg>
+      <pc:sldChg chg="addSp delSp modSp add modNotesTx">
+        <pc:chgData name="Adam, Jannik" userId="209b27c2-fcda-416a-8b1d-a83d71372b3b" providerId="ADAL" clId="{215F5312-CD1D-4533-8BA6-96026F56AC75}" dt="2018-12-11T10:39:42.778" v="565" actId="20577"/>
+        <pc:sldMkLst>
+          <pc:docMk/>
+          <pc:sldMk cId="734791144" sldId="279"/>
+        </pc:sldMkLst>
+        <pc:spChg chg="mod">
+          <ac:chgData name="Adam, Jannik" userId="209b27c2-fcda-416a-8b1d-a83d71372b3b" providerId="ADAL" clId="{215F5312-CD1D-4533-8BA6-96026F56AC75}" dt="2018-12-11T09:57:42.864" v="23" actId="20577"/>
+          <ac:spMkLst>
+            <pc:docMk/>
+            <pc:sldMk cId="734791144" sldId="279"/>
+            <ac:spMk id="2" creationId="{0FA30728-EB32-409F-AA34-5F018C28C31B}"/>
+          </ac:spMkLst>
+        </pc:spChg>
+        <pc:spChg chg="del">
+          <ac:chgData name="Adam, Jannik" userId="209b27c2-fcda-416a-8b1d-a83d71372b3b" providerId="ADAL" clId="{215F5312-CD1D-4533-8BA6-96026F56AC75}" dt="2018-12-11T09:57:52.690" v="24"/>
+          <ac:spMkLst>
+            <pc:docMk/>
+            <pc:sldMk cId="734791144" sldId="279"/>
+            <ac:spMk id="3" creationId="{BE377C6B-29A0-498F-B441-2339D30BBDFA}"/>
+          </ac:spMkLst>
+        </pc:spChg>
+        <pc:spChg chg="add mod">
+          <ac:chgData name="Adam, Jannik" userId="209b27c2-fcda-416a-8b1d-a83d71372b3b" providerId="ADAL" clId="{215F5312-CD1D-4533-8BA6-96026F56AC75}" dt="2018-12-11T10:39:29.718" v="562" actId="115"/>
+          <ac:spMkLst>
+            <pc:docMk/>
+            <pc:sldMk cId="734791144" sldId="279"/>
+            <ac:spMk id="4" creationId="{2FBD1086-A9C1-4770-8595-D949D35C3EA1}"/>
+          </ac:spMkLst>
+        </pc:spChg>
+        <pc:spChg chg="add mod">
+          <ac:chgData name="Adam, Jannik" userId="209b27c2-fcda-416a-8b1d-a83d71372b3b" providerId="ADAL" clId="{215F5312-CD1D-4533-8BA6-96026F56AC75}" dt="2018-12-11T10:39:42.778" v="565" actId="20577"/>
+          <ac:spMkLst>
+            <pc:docMk/>
+            <pc:sldMk cId="734791144" sldId="279"/>
+            <ac:spMk id="5" creationId="{A6C326F7-34B7-4588-AF1E-2B387B8C68AD}"/>
+          </ac:spMkLst>
+        </pc:spChg>
+        <pc:spChg chg="add mod">
+          <ac:chgData name="Adam, Jannik" userId="209b27c2-fcda-416a-8b1d-a83d71372b3b" providerId="ADAL" clId="{215F5312-CD1D-4533-8BA6-96026F56AC75}" dt="2018-12-11T10:39:32.889" v="563" actId="115"/>
+          <ac:spMkLst>
+            <pc:docMk/>
+            <pc:sldMk cId="734791144" sldId="279"/>
+            <ac:spMk id="6" creationId="{7AC0920D-B5CF-445C-AB50-D535177985B6}"/>
+          </ac:spMkLst>
+        </pc:spChg>
+        <pc:spChg chg="add mod">
+          <ac:chgData name="Adam, Jannik" userId="209b27c2-fcda-416a-8b1d-a83d71372b3b" providerId="ADAL" clId="{215F5312-CD1D-4533-8BA6-96026F56AC75}" dt="2018-12-11T10:39:11.160" v="558" actId="20577"/>
+          <ac:spMkLst>
+            <pc:docMk/>
+            <pc:sldMk cId="734791144" sldId="279"/>
+            <ac:spMk id="7" creationId="{F1E8DF26-05A8-49B0-A800-59E4FCFB4339}"/>
+          </ac:spMkLst>
+        </pc:spChg>
+      </pc:sldChg>
+      <pc:sldChg chg="modSp add modNotesTx">
+        <pc:chgData name="Adam, Jannik" userId="209b27c2-fcda-416a-8b1d-a83d71372b3b" providerId="ADAL" clId="{215F5312-CD1D-4533-8BA6-96026F56AC75}" dt="2018-12-11T10:37:53.053" v="550" actId="20577"/>
+        <pc:sldMkLst>
+          <pc:docMk/>
+          <pc:sldMk cId="3872291973" sldId="280"/>
+        </pc:sldMkLst>
+        <pc:spChg chg="mod">
+          <ac:chgData name="Adam, Jannik" userId="209b27c2-fcda-416a-8b1d-a83d71372b3b" providerId="ADAL" clId="{215F5312-CD1D-4533-8BA6-96026F56AC75}" dt="2018-12-11T10:37:53.053" v="550" actId="20577"/>
+          <ac:spMkLst>
+            <pc:docMk/>
+            <pc:sldMk cId="3872291973" sldId="280"/>
+            <ac:spMk id="2" creationId="{49D27BEB-2C2D-400B-BC08-907B62CBF066}"/>
+          </ac:spMkLst>
+        </pc:spChg>
+        <pc:spChg chg="mod">
+          <ac:chgData name="Adam, Jannik" userId="209b27c2-fcda-416a-8b1d-a83d71372b3b" providerId="ADAL" clId="{215F5312-CD1D-4533-8BA6-96026F56AC75}" dt="2018-12-11T10:06:07.708" v="442" actId="20577"/>
+          <ac:spMkLst>
+            <pc:docMk/>
+            <pc:sldMk cId="3872291973" sldId="280"/>
+            <ac:spMk id="3" creationId="{02113537-1C9F-4BB5-8392-7FC7C1917027}"/>
+          </ac:spMkLst>
+        </pc:spChg>
+      </pc:sldChg>
+    </pc:docChg>
+  </pc:docChgLst>
+  <pc:docChgLst>
     <pc:chgData name="Adam, Jannik" userId="209b27c2-fcda-416a-8b1d-a83d71372b3b" providerId="ADAL" clId="{73F3D2C3-2794-4F20-AFCC-83E0B65A5304}"/>
     <pc:docChg chg="undo custSel addSld delSld modSld sldOrd">
       <pc:chgData name="Adam, Jannik" userId="209b27c2-fcda-416a-8b1d-a83d71372b3b" providerId="ADAL" clId="{73F3D2C3-2794-4F20-AFCC-83E0B65A5304}" dt="2018-12-10T11:13:57.622" v="1528" actId="20577"/>
@@ -242,21 +354,6 @@
           </ac:picMkLst>
         </pc:picChg>
       </pc:sldChg>
-      <pc:sldChg chg="modSp add del">
-        <pc:chgData name="Adam, Jannik" userId="209b27c2-fcda-416a-8b1d-a83d71372b3b" providerId="ADAL" clId="{73F3D2C3-2794-4F20-AFCC-83E0B65A5304}" dt="2018-12-09T11:42:35.016" v="882" actId="2696"/>
-        <pc:sldMkLst>
-          <pc:docMk/>
-          <pc:sldMk cId="1519205980" sldId="259"/>
-        </pc:sldMkLst>
-        <pc:spChg chg="mod">
-          <ac:chgData name="Adam, Jannik" userId="209b27c2-fcda-416a-8b1d-a83d71372b3b" providerId="ADAL" clId="{73F3D2C3-2794-4F20-AFCC-83E0B65A5304}" dt="2018-12-08T12:11:29.443" v="50" actId="20577"/>
-          <ac:spMkLst>
-            <pc:docMk/>
-            <pc:sldMk cId="1519205980" sldId="259"/>
-            <ac:spMk id="2" creationId="{D52BA45A-5F4A-46DE-87DC-77F0EAF4FDE3}"/>
-          </ac:spMkLst>
-        </pc:spChg>
-      </pc:sldChg>
       <pc:sldChg chg="modSp add">
         <pc:chgData name="Adam, Jannik" userId="209b27c2-fcda-416a-8b1d-a83d71372b3b" providerId="ADAL" clId="{73F3D2C3-2794-4F20-AFCC-83E0B65A5304}" dt="2018-12-09T12:32:44.114" v="1286" actId="20577"/>
         <pc:sldMkLst>
@@ -304,7 +401,7 @@
         </pc:spChg>
       </pc:sldChg>
       <pc:sldChg chg="addSp delSp modSp add ord modNotesTx">
-        <pc:chgData name="Adam, Jannik" userId="209b27c2-fcda-416a-8b1d-a83d71372b3b" providerId="ADAL" clId="{73F3D2C3-2794-4F20-AFCC-83E0B65A5304}" dt="2018-12-10T09:12:22.562" v="1324"/>
+        <pc:chgData name="Adam, Jannik" userId="209b27c2-fcda-416a-8b1d-a83d71372b3b" providerId="ADAL" clId="{73F3D2C3-2794-4F20-AFCC-83E0B65A5304}" dt="2018-12-10T09:12:22.562" v="1324" actId="20577"/>
         <pc:sldMkLst>
           <pc:docMk/>
           <pc:sldMk cId="1641111275" sldId="262"/>
@@ -333,21 +430,6 @@
             <ac:picMk id="5" creationId="{87CB9A68-1ACA-452B-9D15-54979A202FE6}"/>
           </ac:picMkLst>
         </pc:picChg>
-      </pc:sldChg>
-      <pc:sldChg chg="modSp add del ord">
-        <pc:chgData name="Adam, Jannik" userId="209b27c2-fcda-416a-8b1d-a83d71372b3b" providerId="ADAL" clId="{73F3D2C3-2794-4F20-AFCC-83E0B65A5304}" dt="2018-12-09T11:50:15.505" v="928" actId="2696"/>
-        <pc:sldMkLst>
-          <pc:docMk/>
-          <pc:sldMk cId="4101714887" sldId="263"/>
-        </pc:sldMkLst>
-        <pc:spChg chg="mod">
-          <ac:chgData name="Adam, Jannik" userId="209b27c2-fcda-416a-8b1d-a83d71372b3b" providerId="ADAL" clId="{73F3D2C3-2794-4F20-AFCC-83E0B65A5304}" dt="2018-12-08T12:13:01.454" v="109" actId="20577"/>
-          <ac:spMkLst>
-            <pc:docMk/>
-            <pc:sldMk cId="4101714887" sldId="263"/>
-            <ac:spMk id="2" creationId="{BFA57A8F-ECB5-47DD-BCFB-32CF835A70A8}"/>
-          </ac:spMkLst>
-        </pc:spChg>
       </pc:sldChg>
       <pc:sldChg chg="addSp delSp modSp add del ord">
         <pc:chgData name="Adam, Jannik" userId="209b27c2-fcda-416a-8b1d-a83d71372b3b" providerId="ADAL" clId="{73F3D2C3-2794-4F20-AFCC-83E0B65A5304}" dt="2018-12-10T09:13:23.603" v="1326" actId="2696"/>
@@ -408,60 +490,6 @@
             <pc:docMk/>
             <pc:sldMk cId="2374509222" sldId="265"/>
             <ac:spMk id="3" creationId="{C367B8E3-D44B-4939-9687-72A5287E4675}"/>
-          </ac:spMkLst>
-        </pc:spChg>
-      </pc:sldChg>
-      <pc:sldChg chg="addSp delSp modSp add del">
-        <pc:chgData name="Adam, Jannik" userId="209b27c2-fcda-416a-8b1d-a83d71372b3b" providerId="ADAL" clId="{73F3D2C3-2794-4F20-AFCC-83E0B65A5304}" dt="2018-12-09T11:47:17.440" v="898" actId="2696"/>
-        <pc:sldMkLst>
-          <pc:docMk/>
-          <pc:sldMk cId="3875953914" sldId="266"/>
-        </pc:sldMkLst>
-        <pc:spChg chg="mod">
-          <ac:chgData name="Adam, Jannik" userId="209b27c2-fcda-416a-8b1d-a83d71372b3b" providerId="ADAL" clId="{73F3D2C3-2794-4F20-AFCC-83E0B65A5304}" dt="2018-12-08T12:14:00.698" v="181" actId="20577"/>
-          <ac:spMkLst>
-            <pc:docMk/>
-            <pc:sldMk cId="3875953914" sldId="266"/>
-            <ac:spMk id="2" creationId="{77D2CA70-732E-4A84-BA04-6033A4D93A71}"/>
-          </ac:spMkLst>
-        </pc:spChg>
-        <pc:spChg chg="del">
-          <ac:chgData name="Adam, Jannik" userId="209b27c2-fcda-416a-8b1d-a83d71372b3b" providerId="ADAL" clId="{73F3D2C3-2794-4F20-AFCC-83E0B65A5304}" dt="2018-12-09T11:43:53.909" v="885" actId="931"/>
-          <ac:spMkLst>
-            <pc:docMk/>
-            <pc:sldMk cId="3875953914" sldId="266"/>
-            <ac:spMk id="3" creationId="{63CD1C84-8829-4C37-9DC7-319100DC1C4F}"/>
-          </ac:spMkLst>
-        </pc:spChg>
-        <pc:spChg chg="add mod">
-          <ac:chgData name="Adam, Jannik" userId="209b27c2-fcda-416a-8b1d-a83d71372b3b" providerId="ADAL" clId="{73F3D2C3-2794-4F20-AFCC-83E0B65A5304}" dt="2018-12-09T11:44:48.069" v="891" actId="2696"/>
-          <ac:spMkLst>
-            <pc:docMk/>
-            <pc:sldMk cId="3875953914" sldId="266"/>
-            <ac:spMk id="6" creationId="{6AAA7ED0-C22E-4ACC-BA36-0C7FDF01CE45}"/>
-          </ac:spMkLst>
-        </pc:spChg>
-        <pc:picChg chg="add del mod">
-          <ac:chgData name="Adam, Jannik" userId="209b27c2-fcda-416a-8b1d-a83d71372b3b" providerId="ADAL" clId="{73F3D2C3-2794-4F20-AFCC-83E0B65A5304}" dt="2018-12-09T11:44:48.069" v="891" actId="2696"/>
-          <ac:picMkLst>
-            <pc:docMk/>
-            <pc:sldMk cId="3875953914" sldId="266"/>
-            <ac:picMk id="5" creationId="{B00A1BD5-CD48-4597-8312-683F67CCC04F}"/>
-          </ac:picMkLst>
-        </pc:picChg>
-      </pc:sldChg>
-      <pc:sldChg chg="modSp add del ord">
-        <pc:chgData name="Adam, Jannik" userId="209b27c2-fcda-416a-8b1d-a83d71372b3b" providerId="ADAL" clId="{73F3D2C3-2794-4F20-AFCC-83E0B65A5304}" dt="2018-12-09T12:28:04.936" v="1266" actId="2696"/>
-        <pc:sldMkLst>
-          <pc:docMk/>
-          <pc:sldMk cId="454005944" sldId="267"/>
-        </pc:sldMkLst>
-        <pc:spChg chg="mod">
-          <ac:chgData name="Adam, Jannik" userId="209b27c2-fcda-416a-8b1d-a83d71372b3b" providerId="ADAL" clId="{73F3D2C3-2794-4F20-AFCC-83E0B65A5304}" dt="2018-12-08T12:14:10.057" v="189" actId="20577"/>
-          <ac:spMkLst>
-            <pc:docMk/>
-            <pc:sldMk cId="454005944" sldId="267"/>
-            <ac:spMk id="2" creationId="{BBC530A3-0C79-4974-8967-07A089AA4681}"/>
           </ac:spMkLst>
         </pc:spChg>
       </pc:sldChg>
@@ -543,7 +571,7 @@
         </pc:spChg>
       </pc:sldChg>
       <pc:sldChg chg="addSp delSp modSp add ord">
-        <pc:chgData name="Adam, Jannik" userId="209b27c2-fcda-416a-8b1d-a83d71372b3b" providerId="ADAL" clId="{73F3D2C3-2794-4F20-AFCC-83E0B65A5304}" dt="2018-12-10T09:14:27.990" v="1386"/>
+        <pc:chgData name="Adam, Jannik" userId="209b27c2-fcda-416a-8b1d-a83d71372b3b" providerId="ADAL" clId="{73F3D2C3-2794-4F20-AFCC-83E0B65A5304}" dt="2018-12-10T09:14:27.990" v="1386" actId="20577"/>
         <pc:sldMkLst>
           <pc:docMk/>
           <pc:sldMk cId="18714969" sldId="271"/>
@@ -580,29 +608,6 @@
             <ac:picMk id="4" creationId="{5930C314-3D7F-4EFD-B5B0-EE30CB8C6147}"/>
           </ac:picMkLst>
         </pc:picChg>
-      </pc:sldChg>
-      <pc:sldChg chg="modSp add del">
-        <pc:chgData name="Adam, Jannik" userId="209b27c2-fcda-416a-8b1d-a83d71372b3b" providerId="ADAL" clId="{73F3D2C3-2794-4F20-AFCC-83E0B65A5304}" dt="2018-12-09T11:38:45.664" v="879" actId="2696"/>
-        <pc:sldMkLst>
-          <pc:docMk/>
-          <pc:sldMk cId="872861853" sldId="271"/>
-        </pc:sldMkLst>
-        <pc:spChg chg="mod">
-          <ac:chgData name="Adam, Jannik" userId="209b27c2-fcda-416a-8b1d-a83d71372b3b" providerId="ADAL" clId="{73F3D2C3-2794-4F20-AFCC-83E0B65A5304}" dt="2018-12-08T23:06:38.320" v="402" actId="20577"/>
-          <ac:spMkLst>
-            <pc:docMk/>
-            <pc:sldMk cId="872861853" sldId="271"/>
-            <ac:spMk id="2" creationId="{3E482467-7028-43A9-A476-1B13E9AB1E10}"/>
-          </ac:spMkLst>
-        </pc:spChg>
-        <pc:spChg chg="mod">
-          <ac:chgData name="Adam, Jannik" userId="209b27c2-fcda-416a-8b1d-a83d71372b3b" providerId="ADAL" clId="{73F3D2C3-2794-4F20-AFCC-83E0B65A5304}" dt="2018-12-08T23:07:12.242" v="412" actId="20577"/>
-          <ac:spMkLst>
-            <pc:docMk/>
-            <pc:sldMk cId="872861853" sldId="271"/>
-            <ac:spMk id="3" creationId="{D72CF631-5C46-423D-BB16-6AC291C62C4C}"/>
-          </ac:spMkLst>
-        </pc:spChg>
       </pc:sldChg>
       <pc:sldChg chg="addSp delSp modSp add">
         <pc:chgData name="Adam, Jannik" userId="209b27c2-fcda-416a-8b1d-a83d71372b3b" providerId="ADAL" clId="{73F3D2C3-2794-4F20-AFCC-83E0B65A5304}" dt="2018-12-09T11:57:27.408" v="952" actId="14100"/>
@@ -712,13 +717,6 @@
           </ac:spMkLst>
         </pc:spChg>
       </pc:sldChg>
-      <pc:sldChg chg="add del">
-        <pc:chgData name="Adam, Jannik" userId="209b27c2-fcda-416a-8b1d-a83d71372b3b" providerId="ADAL" clId="{73F3D2C3-2794-4F20-AFCC-83E0B65A5304}" dt="2018-12-09T12:38:27.293" v="1287" actId="2696"/>
-        <pc:sldMkLst>
-          <pc:docMk/>
-          <pc:sldMk cId="2906702637" sldId="275"/>
-        </pc:sldMkLst>
-      </pc:sldChg>
       <pc:sldChg chg="addSp delSp modSp add">
         <pc:chgData name="Adam, Jannik" userId="209b27c2-fcda-416a-8b1d-a83d71372b3b" providerId="ADAL" clId="{73F3D2C3-2794-4F20-AFCC-83E0B65A5304}" dt="2018-12-10T11:13:57.622" v="1528" actId="20577"/>
         <pc:sldMkLst>
@@ -726,7 +724,7 @@
           <pc:sldMk cId="3762170802" sldId="276"/>
         </pc:sldMkLst>
         <pc:spChg chg="del">
-          <ac:chgData name="Adam, Jannik" userId="209b27c2-fcda-416a-8b1d-a83d71372b3b" providerId="ADAL" clId="{73F3D2C3-2794-4F20-AFCC-83E0B65A5304}" dt="2018-12-10T09:15:03.335" v="1388"/>
+          <ac:chgData name="Adam, Jannik" userId="209b27c2-fcda-416a-8b1d-a83d71372b3b" providerId="ADAL" clId="{73F3D2C3-2794-4F20-AFCC-83E0B65A5304}" dt="2018-12-10T09:15:03.335" v="1388" actId="20577"/>
           <ac:spMkLst>
             <pc:docMk/>
             <pc:sldMk cId="3762170802" sldId="276"/>
@@ -734,7 +732,7 @@
           </ac:spMkLst>
         </pc:spChg>
         <pc:spChg chg="del">
-          <ac:chgData name="Adam, Jannik" userId="209b27c2-fcda-416a-8b1d-a83d71372b3b" providerId="ADAL" clId="{73F3D2C3-2794-4F20-AFCC-83E0B65A5304}" dt="2018-12-10T09:15:03.335" v="1388"/>
+          <ac:chgData name="Adam, Jannik" userId="209b27c2-fcda-416a-8b1d-a83d71372b3b" providerId="ADAL" clId="{73F3D2C3-2794-4F20-AFCC-83E0B65A5304}" dt="2018-12-10T09:15:03.335" v="1388" actId="20577"/>
           <ac:spMkLst>
             <pc:docMk/>
             <pc:sldMk cId="3762170802" sldId="276"/>
@@ -765,7 +763,7 @@
           <pc:sldMk cId="3881915204" sldId="277"/>
         </pc:sldMkLst>
         <pc:spChg chg="del">
-          <ac:chgData name="Adam, Jannik" userId="209b27c2-fcda-416a-8b1d-a83d71372b3b" providerId="ADAL" clId="{73F3D2C3-2794-4F20-AFCC-83E0B65A5304}" dt="2018-12-10T09:15:50.306" v="1431"/>
+          <ac:chgData name="Adam, Jannik" userId="209b27c2-fcda-416a-8b1d-a83d71372b3b" providerId="ADAL" clId="{73F3D2C3-2794-4F20-AFCC-83E0B65A5304}" dt="2018-12-10T09:15:50.306" v="1431" actId="20577"/>
           <ac:spMkLst>
             <pc:docMk/>
             <pc:sldMk cId="3881915204" sldId="277"/>
@@ -773,7 +771,7 @@
           </ac:spMkLst>
         </pc:spChg>
         <pc:spChg chg="del">
-          <ac:chgData name="Adam, Jannik" userId="209b27c2-fcda-416a-8b1d-a83d71372b3b" providerId="ADAL" clId="{73F3D2C3-2794-4F20-AFCC-83E0B65A5304}" dt="2018-12-10T09:15:50.306" v="1431"/>
+          <ac:chgData name="Adam, Jannik" userId="209b27c2-fcda-416a-8b1d-a83d71372b3b" providerId="ADAL" clId="{73F3D2C3-2794-4F20-AFCC-83E0B65A5304}" dt="2018-12-10T09:15:50.306" v="1431" actId="20577"/>
           <ac:spMkLst>
             <pc:docMk/>
             <pc:sldMk cId="3881915204" sldId="277"/>
@@ -804,7 +802,7 @@
           <pc:sldMk cId="1033428282" sldId="278"/>
         </pc:sldMkLst>
         <pc:spChg chg="add del">
-          <ac:chgData name="Adam, Jannik" userId="209b27c2-fcda-416a-8b1d-a83d71372b3b" providerId="ADAL" clId="{73F3D2C3-2794-4F20-AFCC-83E0B65A5304}" dt="2018-12-10T09:17:13.047" v="1473"/>
+          <ac:chgData name="Adam, Jannik" userId="209b27c2-fcda-416a-8b1d-a83d71372b3b" providerId="ADAL" clId="{73F3D2C3-2794-4F20-AFCC-83E0B65A5304}" dt="2018-12-10T09:17:13.047" v="1473" actId="20577"/>
           <ac:spMkLst>
             <pc:docMk/>
             <pc:sldMk cId="1033428282" sldId="278"/>
@@ -812,7 +810,7 @@
           </ac:spMkLst>
         </pc:spChg>
         <pc:spChg chg="add del">
-          <ac:chgData name="Adam, Jannik" userId="209b27c2-fcda-416a-8b1d-a83d71372b3b" providerId="ADAL" clId="{73F3D2C3-2794-4F20-AFCC-83E0B65A5304}" dt="2018-12-10T09:17:13.047" v="1473"/>
+          <ac:chgData name="Adam, Jannik" userId="209b27c2-fcda-416a-8b1d-a83d71372b3b" providerId="ADAL" clId="{73F3D2C3-2794-4F20-AFCC-83E0B65A5304}" dt="2018-12-10T09:17:13.047" v="1473" actId="20577"/>
           <ac:spMkLst>
             <pc:docMk/>
             <pc:sldMk cId="1033428282" sldId="278"/>
@@ -820,7 +818,7 @@
           </ac:spMkLst>
         </pc:spChg>
         <pc:spChg chg="add del mod">
-          <ac:chgData name="Adam, Jannik" userId="209b27c2-fcda-416a-8b1d-a83d71372b3b" providerId="ADAL" clId="{73F3D2C3-2794-4F20-AFCC-83E0B65A5304}" dt="2018-12-10T09:16:40.063" v="1472"/>
+          <ac:chgData name="Adam, Jannik" userId="209b27c2-fcda-416a-8b1d-a83d71372b3b" providerId="ADAL" clId="{73F3D2C3-2794-4F20-AFCC-83E0B65A5304}" dt="2018-12-10T09:16:40.063" v="1472" actId="20577"/>
           <ac:spMkLst>
             <pc:docMk/>
             <pc:sldMk cId="1033428282" sldId="278"/>
@@ -828,7 +826,7 @@
           </ac:spMkLst>
         </pc:spChg>
         <pc:spChg chg="add del mod">
-          <ac:chgData name="Adam, Jannik" userId="209b27c2-fcda-416a-8b1d-a83d71372b3b" providerId="ADAL" clId="{73F3D2C3-2794-4F20-AFCC-83E0B65A5304}" dt="2018-12-10T09:16:40.063" v="1472"/>
+          <ac:chgData name="Adam, Jannik" userId="209b27c2-fcda-416a-8b1d-a83d71372b3b" providerId="ADAL" clId="{73F3D2C3-2794-4F20-AFCC-83E0B65A5304}" dt="2018-12-10T09:16:40.063" v="1472" actId="20577"/>
           <ac:spMkLst>
             <pc:docMk/>
             <pc:sldMk cId="1033428282" sldId="278"/>
@@ -836,7 +834,7 @@
           </ac:spMkLst>
         </pc:spChg>
         <pc:spChg chg="add del mod">
-          <ac:chgData name="Adam, Jannik" userId="209b27c2-fcda-416a-8b1d-a83d71372b3b" providerId="ADAL" clId="{73F3D2C3-2794-4F20-AFCC-83E0B65A5304}" dt="2018-12-10T09:16:40.063" v="1472"/>
+          <ac:chgData name="Adam, Jannik" userId="209b27c2-fcda-416a-8b1d-a83d71372b3b" providerId="ADAL" clId="{73F3D2C3-2794-4F20-AFCC-83E0B65A5304}" dt="2018-12-10T09:16:40.063" v="1472" actId="20577"/>
           <ac:spMkLst>
             <pc:docMk/>
             <pc:sldMk cId="1033428282" sldId="278"/>
@@ -947,7 +945,7 @@
           <a:p>
             <a:fld id="{A90D49F0-98B8-4FE6-848F-D08A377A74A3}" type="datetimeFigureOut">
               <a:rPr lang="de-DE" smtClean="0"/>
-              <a:t>10.12.2018</a:t>
+              <a:t>11.12.2018</a:t>
             </a:fld>
             <a:endParaRPr lang="de-DE"/>
           </a:p>
@@ -1260,8 +1258,24 @@
           <a:lstStyle/>
           <a:p>
             <a:r>
+              <a:rPr lang="en-US" dirty="0"/>
+              <a:t>it does not necessarily have to be about studying</a:t>
+            </a:r>
+            <a:endParaRPr lang="de-DE" dirty="0"/>
+          </a:p>
+          <a:p>
+            <a:endParaRPr lang="de-DE" dirty="0"/>
+          </a:p>
+          <a:p>
+            <a:r>
               <a:rPr lang="de-DE" dirty="0"/>
-              <a:t>Wie sie sehen können, sehen sie nichts -&gt; Fehler eingestehen, im Final wird es besser aussehen</a:t>
+              <a:t>Mit linker Hand Zeugs erledigen</a:t>
+            </a:r>
+          </a:p>
+          <a:p>
+            <a:r>
+              <a:rPr lang="de-DE" dirty="0"/>
+              <a:t>Statur behalten</a:t>
             </a:r>
           </a:p>
         </p:txBody>
@@ -1283,7 +1297,216 @@
           <a:p>
             <a:fld id="{FC494CD1-E8B0-4A81-BFDB-000E07CC5C35}" type="slidenum">
               <a:rPr lang="de-DE" smtClean="0"/>
-              <a:t>7</a:t>
+              <a:t>4</a:t>
+            </a:fld>
+            <a:endParaRPr lang="de-DE"/>
+          </a:p>
+        </p:txBody>
+      </p:sp>
+    </p:spTree>
+    <p:extLst>
+      <p:ext uri="{BB962C8B-B14F-4D97-AF65-F5344CB8AC3E}">
+        <p14:creationId xmlns:p14="http://schemas.microsoft.com/office/powerpoint/2010/main" val="3415272518"/>
+      </p:ext>
+    </p:extLst>
+  </p:cSld>
+  <p:clrMapOvr>
+    <a:masterClrMapping/>
+  </p:clrMapOvr>
+</p:notes>
+</file>
+
+<file path=ppt/notesSlides/notesSlide2.xml><?xml version="1.0" encoding="utf-8"?>
+<p:notes xmlns:a="http://schemas.openxmlformats.org/drawingml/2006/main" xmlns:r="http://schemas.openxmlformats.org/officeDocument/2006/relationships" xmlns:p="http://schemas.openxmlformats.org/presentationml/2006/main">
+  <p:cSld>
+    <p:spTree>
+      <p:nvGrpSpPr>
+        <p:cNvPr id="1" name=""/>
+        <p:cNvGrpSpPr/>
+        <p:nvPr/>
+      </p:nvGrpSpPr>
+      <p:grpSpPr>
+        <a:xfrm>
+          <a:off x="0" y="0"/>
+          <a:ext cx="0" cy="0"/>
+          <a:chOff x="0" y="0"/>
+          <a:chExt cx="0" cy="0"/>
+        </a:xfrm>
+      </p:grpSpPr>
+      <p:sp>
+        <p:nvSpPr>
+          <p:cNvPr id="2" name="Slide Image Placeholder 1"/>
+          <p:cNvSpPr>
+            <a:spLocks noGrp="1" noRot="1" noChangeAspect="1"/>
+          </p:cNvSpPr>
+          <p:nvPr>
+            <p:ph type="sldImg"/>
+          </p:nvPr>
+        </p:nvSpPr>
+        <p:spPr/>
+      </p:sp>
+      <p:sp>
+        <p:nvSpPr>
+          <p:cNvPr id="3" name="Notes Placeholder 2"/>
+          <p:cNvSpPr>
+            <a:spLocks noGrp="1"/>
+          </p:cNvSpPr>
+          <p:nvPr>
+            <p:ph type="body" idx="1"/>
+          </p:nvPr>
+        </p:nvSpPr>
+        <p:spPr/>
+        <p:txBody>
+          <a:bodyPr/>
+          <a:lstStyle/>
+          <a:p>
+            <a:r>
+              <a:rPr lang="en-US" dirty="0" err="1"/>
+              <a:t>Highscore</a:t>
+            </a:r>
+            <a:r>
+              <a:rPr lang="en-US" dirty="0"/>
+              <a:t> system to help you compare yourself with others and track your own improvements.</a:t>
+            </a:r>
+          </a:p>
+          <a:p>
+            <a:r>
+              <a:rPr lang="en-US" dirty="0"/>
+              <a:t>Statistics provide who is first and who is last.</a:t>
+            </a:r>
+          </a:p>
+          <a:p>
+            <a:r>
+              <a:rPr lang="en-US" dirty="0"/>
+              <a:t>Push notifications if you’re last to make sure you step up your game.</a:t>
+            </a:r>
+          </a:p>
+          <a:p>
+            <a:endParaRPr lang="en-US" dirty="0"/>
+          </a:p>
+          <a:p>
+            <a:endParaRPr lang="en-US" dirty="0"/>
+          </a:p>
+          <a:p>
+            <a:r>
+              <a:rPr lang="en-US" dirty="0"/>
+              <a:t>reflect upon him/herself by giving an individual rating after finishing a task. This way you will keep track on the parts you have mastered well, but also areas where you still could need some polishing.</a:t>
+            </a:r>
+          </a:p>
+          <a:p>
+            <a:r>
+              <a:rPr lang="en-US" dirty="0"/>
+              <a:t>You’ll be able to individualize the amount of points rewarded for each task. In addition to this, you can define your own personal rewards, such as eating a Snickers.</a:t>
+            </a:r>
+            <a:endParaRPr lang="de-DE" dirty="0"/>
+          </a:p>
+        </p:txBody>
+      </p:sp>
+      <p:sp>
+        <p:nvSpPr>
+          <p:cNvPr id="4" name="Slide Number Placeholder 3"/>
+          <p:cNvSpPr>
+            <a:spLocks noGrp="1"/>
+          </p:cNvSpPr>
+          <p:nvPr>
+            <p:ph type="sldNum" sz="quarter" idx="10"/>
+          </p:nvPr>
+        </p:nvSpPr>
+        <p:spPr/>
+        <p:txBody>
+          <a:bodyPr/>
+          <a:lstStyle/>
+          <a:p>
+            <a:fld id="{FC494CD1-E8B0-4A81-BFDB-000E07CC5C35}" type="slidenum">
+              <a:rPr lang="de-DE" smtClean="0"/>
+              <a:t>5</a:t>
+            </a:fld>
+            <a:endParaRPr lang="de-DE"/>
+          </a:p>
+        </p:txBody>
+      </p:sp>
+    </p:spTree>
+    <p:extLst>
+      <p:ext uri="{BB962C8B-B14F-4D97-AF65-F5344CB8AC3E}">
+        <p14:creationId xmlns:p14="http://schemas.microsoft.com/office/powerpoint/2010/main" val="3277860849"/>
+      </p:ext>
+    </p:extLst>
+  </p:cSld>
+  <p:clrMapOvr>
+    <a:masterClrMapping/>
+  </p:clrMapOvr>
+</p:notes>
+</file>
+
+<file path=ppt/notesSlides/notesSlide3.xml><?xml version="1.0" encoding="utf-8"?>
+<p:notes xmlns:a="http://schemas.openxmlformats.org/drawingml/2006/main" xmlns:r="http://schemas.openxmlformats.org/officeDocument/2006/relationships" xmlns:p="http://schemas.openxmlformats.org/presentationml/2006/main">
+  <p:cSld>
+    <p:spTree>
+      <p:nvGrpSpPr>
+        <p:cNvPr id="1" name=""/>
+        <p:cNvGrpSpPr/>
+        <p:nvPr/>
+      </p:nvGrpSpPr>
+      <p:grpSpPr>
+        <a:xfrm>
+          <a:off x="0" y="0"/>
+          <a:ext cx="0" cy="0"/>
+          <a:chOff x="0" y="0"/>
+          <a:chExt cx="0" cy="0"/>
+        </a:xfrm>
+      </p:grpSpPr>
+      <p:sp>
+        <p:nvSpPr>
+          <p:cNvPr id="2" name="Slide Image Placeholder 1"/>
+          <p:cNvSpPr>
+            <a:spLocks noGrp="1" noRot="1" noChangeAspect="1"/>
+          </p:cNvSpPr>
+          <p:nvPr>
+            <p:ph type="sldImg"/>
+          </p:nvPr>
+        </p:nvSpPr>
+        <p:spPr/>
+      </p:sp>
+      <p:sp>
+        <p:nvSpPr>
+          <p:cNvPr id="3" name="Notes Placeholder 2"/>
+          <p:cNvSpPr>
+            <a:spLocks noGrp="1"/>
+          </p:cNvSpPr>
+          <p:nvPr>
+            <p:ph type="body" idx="1"/>
+          </p:nvPr>
+        </p:nvSpPr>
+        <p:spPr/>
+        <p:txBody>
+          <a:bodyPr/>
+          <a:lstStyle/>
+          <a:p>
+            <a:r>
+              <a:rPr lang="de-DE" dirty="0"/>
+              <a:t>Wie sie sehen können, sehen sie nichts -&gt; Fehler eingestehen, im Final wird es besser aussehen</a:t>
+            </a:r>
+          </a:p>
+        </p:txBody>
+      </p:sp>
+      <p:sp>
+        <p:nvSpPr>
+          <p:cNvPr id="4" name="Slide Number Placeholder 3"/>
+          <p:cNvSpPr>
+            <a:spLocks noGrp="1"/>
+          </p:cNvSpPr>
+          <p:nvPr>
+            <p:ph type="sldNum" sz="quarter" idx="10"/>
+          </p:nvPr>
+        </p:nvSpPr>
+        <p:spPr/>
+        <p:txBody>
+          <a:bodyPr/>
+          <a:lstStyle/>
+          <a:p>
+            <a:fld id="{FC494CD1-E8B0-4A81-BFDB-000E07CC5C35}" type="slidenum">
+              <a:rPr lang="de-DE" smtClean="0"/>
+              <a:t>9</a:t>
             </a:fld>
             <a:endParaRPr lang="de-DE"/>
           </a:p>
@@ -1637,7 +1860,7 @@
           <a:p>
             <a:fld id="{E17BE7D1-F2F4-437B-9473-475B6E0E4020}" type="datetimeFigureOut">
               <a:rPr lang="de-DE" smtClean="0"/>
-              <a:t>10.12.2018</a:t>
+              <a:t>11.12.2018</a:t>
             </a:fld>
             <a:endParaRPr lang="de-DE"/>
           </a:p>
@@ -2725,7 +2948,7 @@
           <a:p>
             <a:fld id="{E17BE7D1-F2F4-437B-9473-475B6E0E4020}" type="datetimeFigureOut">
               <a:rPr lang="de-DE" smtClean="0"/>
-              <a:t>10.12.2018</a:t>
+              <a:t>11.12.2018</a:t>
             </a:fld>
             <a:endParaRPr lang="de-DE"/>
           </a:p>
@@ -3705,7 +3928,7 @@
           <a:p>
             <a:fld id="{E17BE7D1-F2F4-437B-9473-475B6E0E4020}" type="datetimeFigureOut">
               <a:rPr lang="de-DE" smtClean="0"/>
-              <a:t>10.12.2018</a:t>
+              <a:t>11.12.2018</a:t>
             </a:fld>
             <a:endParaRPr lang="de-DE"/>
           </a:p>
@@ -4839,7 +5062,7 @@
           <a:p>
             <a:fld id="{E17BE7D1-F2F4-437B-9473-475B6E0E4020}" type="datetimeFigureOut">
               <a:rPr lang="de-DE" smtClean="0"/>
-              <a:t>10.12.2018</a:t>
+              <a:t>11.12.2018</a:t>
             </a:fld>
             <a:endParaRPr lang="de-DE"/>
           </a:p>
@@ -5872,7 +6095,7 @@
           <a:p>
             <a:fld id="{E17BE7D1-F2F4-437B-9473-475B6E0E4020}" type="datetimeFigureOut">
               <a:rPr lang="de-DE" smtClean="0"/>
-              <a:t>10.12.2018</a:t>
+              <a:t>11.12.2018</a:t>
             </a:fld>
             <a:endParaRPr lang="de-DE"/>
           </a:p>
@@ -6532,7 +6755,7 @@
           <a:p>
             <a:fld id="{E17BE7D1-F2F4-437B-9473-475B6E0E4020}" type="datetimeFigureOut">
               <a:rPr lang="de-DE" smtClean="0"/>
-              <a:t>10.12.2018</a:t>
+              <a:t>11.12.2018</a:t>
             </a:fld>
             <a:endParaRPr lang="de-DE"/>
           </a:p>
@@ -7393,7 +7616,7 @@
           <a:p>
             <a:fld id="{E17BE7D1-F2F4-437B-9473-475B6E0E4020}" type="datetimeFigureOut">
               <a:rPr lang="de-DE" smtClean="0"/>
-              <a:t>10.12.2018</a:t>
+              <a:t>11.12.2018</a:t>
             </a:fld>
             <a:endParaRPr lang="de-DE"/>
           </a:p>
@@ -7583,7 +7806,7 @@
           <a:p>
             <a:fld id="{E17BE7D1-F2F4-437B-9473-475B6E0E4020}" type="datetimeFigureOut">
               <a:rPr lang="de-DE" smtClean="0"/>
-              <a:t>10.12.2018</a:t>
+              <a:t>11.12.2018</a:t>
             </a:fld>
             <a:endParaRPr lang="de-DE"/>
           </a:p>
@@ -8555,7 +8778,7 @@
           <a:p>
             <a:fld id="{E17BE7D1-F2F4-437B-9473-475B6E0E4020}" type="datetimeFigureOut">
               <a:rPr lang="de-DE" smtClean="0"/>
-              <a:t>10.12.2018</a:t>
+              <a:t>11.12.2018</a:t>
             </a:fld>
             <a:endParaRPr lang="de-DE"/>
           </a:p>
@@ -8766,7 +8989,7 @@
           <a:p>
             <a:fld id="{E17BE7D1-F2F4-437B-9473-475B6E0E4020}" type="datetimeFigureOut">
               <a:rPr lang="de-DE" smtClean="0"/>
-              <a:t>10.12.2018</a:t>
+              <a:t>11.12.2018</a:t>
             </a:fld>
             <a:endParaRPr lang="de-DE"/>
           </a:p>
@@ -9800,7 +10023,7 @@
           <a:p>
             <a:fld id="{E17BE7D1-F2F4-437B-9473-475B6E0E4020}" type="datetimeFigureOut">
               <a:rPr lang="de-DE" smtClean="0"/>
-              <a:t>10.12.2018</a:t>
+              <a:t>11.12.2018</a:t>
             </a:fld>
             <a:endParaRPr lang="de-DE"/>
           </a:p>
@@ -10072,7 +10295,7 @@
           <a:p>
             <a:fld id="{E17BE7D1-F2F4-437B-9473-475B6E0E4020}" type="datetimeFigureOut">
               <a:rPr lang="de-DE" smtClean="0"/>
-              <a:t>10.12.2018</a:t>
+              <a:t>11.12.2018</a:t>
             </a:fld>
             <a:endParaRPr lang="de-DE"/>
           </a:p>
@@ -10482,7 +10705,7 @@
           <a:p>
             <a:fld id="{E17BE7D1-F2F4-437B-9473-475B6E0E4020}" type="datetimeFigureOut">
               <a:rPr lang="de-DE" smtClean="0"/>
-              <a:t>10.12.2018</a:t>
+              <a:t>11.12.2018</a:t>
             </a:fld>
             <a:endParaRPr lang="de-DE"/>
           </a:p>
@@ -10609,7 +10832,7 @@
           <a:p>
             <a:fld id="{E17BE7D1-F2F4-437B-9473-475B6E0E4020}" type="datetimeFigureOut">
               <a:rPr lang="de-DE" smtClean="0"/>
-              <a:t>10.12.2018</a:t>
+              <a:t>11.12.2018</a:t>
             </a:fld>
             <a:endParaRPr lang="de-DE"/>
           </a:p>
@@ -10704,7 +10927,7 @@
           <a:p>
             <a:fld id="{E17BE7D1-F2F4-437B-9473-475B6E0E4020}" type="datetimeFigureOut">
               <a:rPr lang="de-DE" smtClean="0"/>
-              <a:t>10.12.2018</a:t>
+              <a:t>11.12.2018</a:t>
             </a:fld>
             <a:endParaRPr lang="de-DE"/>
           </a:p>
@@ -11785,7 +12008,7 @@
           <a:p>
             <a:fld id="{E17BE7D1-F2F4-437B-9473-475B6E0E4020}" type="datetimeFigureOut">
               <a:rPr lang="de-DE" smtClean="0"/>
-              <a:t>10.12.2018</a:t>
+              <a:t>11.12.2018</a:t>
             </a:fld>
             <a:endParaRPr lang="de-DE"/>
           </a:p>
@@ -12893,7 +13116,7 @@
           <a:p>
             <a:fld id="{E17BE7D1-F2F4-437B-9473-475B6E0E4020}" type="datetimeFigureOut">
               <a:rPr lang="de-DE" smtClean="0"/>
-              <a:t>10.12.2018</a:t>
+              <a:t>11.12.2018</a:t>
             </a:fld>
             <a:endParaRPr lang="de-DE"/>
           </a:p>
@@ -13890,7 +14113,7 @@
           <a:p>
             <a:fld id="{E17BE7D1-F2F4-437B-9473-475B6E0E4020}" type="datetimeFigureOut">
               <a:rPr lang="de-DE" smtClean="0"/>
-              <a:t>10.12.2018</a:t>
+              <a:t>11.12.2018</a:t>
             </a:fld>
             <a:endParaRPr lang="de-DE"/>
           </a:p>
@@ -14619,6 +14842,193 @@
           <a:chExt cx="0" cy="0"/>
         </a:xfrm>
       </p:grpSpPr>
+      <p:sp>
+        <p:nvSpPr>
+          <p:cNvPr id="2" name="Title 1">
+            <a:extLst>
+              <a:ext uri="{FF2B5EF4-FFF2-40B4-BE49-F238E27FC236}">
+                <a16:creationId xmlns:a16="http://schemas.microsoft.com/office/drawing/2014/main" id="{23769D50-5763-43A5-B494-F013FE7B7748}"/>
+              </a:ext>
+            </a:extLst>
+          </p:cNvPr>
+          <p:cNvSpPr>
+            <a:spLocks noGrp="1"/>
+          </p:cNvSpPr>
+          <p:nvPr>
+            <p:ph type="title"/>
+          </p:nvPr>
+        </p:nvSpPr>
+        <p:spPr/>
+        <p:txBody>
+          <a:bodyPr/>
+          <a:lstStyle/>
+          <a:p>
+            <a:r>
+              <a:rPr lang="de-DE" dirty="0" err="1"/>
+              <a:t>Burndown</a:t>
+            </a:r>
+            <a:endParaRPr lang="de-DE" dirty="0"/>
+          </a:p>
+        </p:txBody>
+      </p:sp>
+      <p:pic>
+        <p:nvPicPr>
+          <p:cNvPr id="5" name="Content Placeholder 4">
+            <a:extLst>
+              <a:ext uri="{FF2B5EF4-FFF2-40B4-BE49-F238E27FC236}">
+                <a16:creationId xmlns:a16="http://schemas.microsoft.com/office/drawing/2014/main" id="{DE29F729-B37F-4413-B337-336B4F66902C}"/>
+              </a:ext>
+            </a:extLst>
+          </p:cNvPr>
+          <p:cNvPicPr>
+            <a:picLocks noGrp="1" noChangeAspect="1"/>
+          </p:cNvPicPr>
+          <p:nvPr>
+            <p:ph idx="1"/>
+          </p:nvPr>
+        </p:nvPicPr>
+        <p:blipFill>
+          <a:blip r:embed="rId2"/>
+          <a:stretch>
+            <a:fillRect/>
+          </a:stretch>
+        </p:blipFill>
+        <p:spPr>
+          <a:xfrm>
+            <a:off x="1154953" y="1680631"/>
+            <a:ext cx="9243915" cy="5178897"/>
+          </a:xfrm>
+        </p:spPr>
+      </p:pic>
+    </p:spTree>
+    <p:extLst>
+      <p:ext uri="{BB962C8B-B14F-4D97-AF65-F5344CB8AC3E}">
+        <p14:creationId xmlns:p14="http://schemas.microsoft.com/office/powerpoint/2010/main" val="3198243135"/>
+      </p:ext>
+    </p:extLst>
+  </p:cSld>
+  <p:clrMapOvr>
+    <a:masterClrMapping/>
+  </p:clrMapOvr>
+</p:sld>
+</file>
+
+<file path=ppt/slides/slide11.xml><?xml version="1.0" encoding="utf-8"?>
+<p:sld xmlns:a="http://schemas.openxmlformats.org/drawingml/2006/main" xmlns:r="http://schemas.openxmlformats.org/officeDocument/2006/relationships" xmlns:p="http://schemas.openxmlformats.org/presentationml/2006/main">
+  <p:cSld>
+    <p:spTree>
+      <p:nvGrpSpPr>
+        <p:cNvPr id="1" name=""/>
+        <p:cNvGrpSpPr/>
+        <p:nvPr/>
+      </p:nvGrpSpPr>
+      <p:grpSpPr>
+        <a:xfrm>
+          <a:off x="0" y="0"/>
+          <a:ext cx="0" cy="0"/>
+          <a:chOff x="0" y="0"/>
+          <a:chExt cx="0" cy="0"/>
+        </a:xfrm>
+      </p:grpSpPr>
+      <p:sp>
+        <p:nvSpPr>
+          <p:cNvPr id="4" name="Title 3">
+            <a:extLst>
+              <a:ext uri="{FF2B5EF4-FFF2-40B4-BE49-F238E27FC236}">
+                <a16:creationId xmlns:a16="http://schemas.microsoft.com/office/drawing/2014/main" id="{08744978-66D0-4598-89FC-6E1D65C735E0}"/>
+              </a:ext>
+            </a:extLst>
+          </p:cNvPr>
+          <p:cNvSpPr>
+            <a:spLocks noGrp="1"/>
+          </p:cNvSpPr>
+          <p:nvPr>
+            <p:ph type="title"/>
+          </p:nvPr>
+        </p:nvSpPr>
+        <p:spPr/>
+        <p:txBody>
+          <a:bodyPr/>
+          <a:lstStyle/>
+          <a:p>
+            <a:r>
+              <a:rPr lang="de-DE" dirty="0"/>
+              <a:t>Technology</a:t>
+            </a:r>
+          </a:p>
+        </p:txBody>
+      </p:sp>
+      <p:sp>
+        <p:nvSpPr>
+          <p:cNvPr id="5" name="Text Placeholder 4">
+            <a:extLst>
+              <a:ext uri="{FF2B5EF4-FFF2-40B4-BE49-F238E27FC236}">
+                <a16:creationId xmlns:a16="http://schemas.microsoft.com/office/drawing/2014/main" id="{B17FA400-1047-4336-B54C-30AAE443EB3C}"/>
+              </a:ext>
+            </a:extLst>
+          </p:cNvPr>
+          <p:cNvSpPr>
+            <a:spLocks noGrp="1"/>
+          </p:cNvSpPr>
+          <p:nvPr>
+            <p:ph type="body" idx="1"/>
+          </p:nvPr>
+        </p:nvSpPr>
+        <p:spPr/>
+        <p:txBody>
+          <a:bodyPr/>
+          <a:lstStyle/>
+          <a:p>
+            <a:r>
+              <a:rPr lang="de-DE" dirty="0"/>
+              <a:t>Class </a:t>
+            </a:r>
+            <a:r>
+              <a:rPr lang="de-DE" dirty="0" err="1"/>
+              <a:t>diagram</a:t>
+            </a:r>
+            <a:r>
+              <a:rPr lang="de-DE" dirty="0"/>
+              <a:t>, live </a:t>
+            </a:r>
+            <a:r>
+              <a:rPr lang="de-DE" dirty="0" err="1"/>
+              <a:t>demo</a:t>
+            </a:r>
+            <a:endParaRPr lang="de-DE" dirty="0"/>
+          </a:p>
+        </p:txBody>
+      </p:sp>
+    </p:spTree>
+    <p:extLst>
+      <p:ext uri="{BB962C8B-B14F-4D97-AF65-F5344CB8AC3E}">
+        <p14:creationId xmlns:p14="http://schemas.microsoft.com/office/powerpoint/2010/main" val="3881915204"/>
+      </p:ext>
+    </p:extLst>
+  </p:cSld>
+  <p:clrMapOvr>
+    <a:masterClrMapping/>
+  </p:clrMapOvr>
+</p:sld>
+</file>
+
+<file path=ppt/slides/slide12.xml><?xml version="1.0" encoding="utf-8"?>
+<p:sld xmlns:a="http://schemas.openxmlformats.org/drawingml/2006/main" xmlns:r="http://schemas.openxmlformats.org/officeDocument/2006/relationships" xmlns:p="http://schemas.openxmlformats.org/presentationml/2006/main">
+  <p:cSld>
+    <p:spTree>
+      <p:nvGrpSpPr>
+        <p:cNvPr id="1" name=""/>
+        <p:cNvGrpSpPr/>
+        <p:nvPr/>
+      </p:nvGrpSpPr>
+      <p:grpSpPr>
+        <a:xfrm>
+          <a:off x="0" y="0"/>
+          <a:ext cx="0" cy="0"/>
+          <a:chOff x="0" y="0"/>
+          <a:chExt cx="0" cy="0"/>
+        </a:xfrm>
+      </p:grpSpPr>
       <p:pic>
         <p:nvPicPr>
           <p:cNvPr id="4" name="Content Placeholder 4">
@@ -14701,7 +15111,7 @@
 </p:sld>
 </file>
 
-<file path=ppt/slides/slide11.xml><?xml version="1.0" encoding="utf-8"?>
+<file path=ppt/slides/slide13.xml><?xml version="1.0" encoding="utf-8"?>
 <p:sld xmlns:a="http://schemas.openxmlformats.org/drawingml/2006/main" xmlns:r="http://schemas.openxmlformats.org/officeDocument/2006/relationships" xmlns:p="http://schemas.openxmlformats.org/presentationml/2006/main">
   <p:cSld>
     <p:spTree>
@@ -14823,7 +15233,7 @@
 </p:sld>
 </file>
 
-<file path=ppt/slides/slide12.xml><?xml version="1.0" encoding="utf-8"?>
+<file path=ppt/slides/slide14.xml><?xml version="1.0" encoding="utf-8"?>
 <p:sld xmlns:a="http://schemas.openxmlformats.org/drawingml/2006/main" xmlns:r="http://schemas.openxmlformats.org/officeDocument/2006/relationships" xmlns:p="http://schemas.openxmlformats.org/presentationml/2006/main">
   <p:cSld>
     <p:spTree>
@@ -14917,7 +15327,7 @@
 </p:sld>
 </file>
 
-<file path=ppt/slides/slide13.xml><?xml version="1.0" encoding="utf-8"?>
+<file path=ppt/slides/slide15.xml><?xml version="1.0" encoding="utf-8"?>
 <p:sld xmlns:a="http://schemas.openxmlformats.org/drawingml/2006/main" xmlns:r="http://schemas.openxmlformats.org/officeDocument/2006/relationships" xmlns:p="http://schemas.openxmlformats.org/presentationml/2006/main">
   <p:cSld>
     <p:spTree>
@@ -15108,7 +15518,7 @@
 </p:sld>
 </file>
 
-<file path=ppt/slides/slide14.xml><?xml version="1.0" encoding="utf-8"?>
+<file path=ppt/slides/slide16.xml><?xml version="1.0" encoding="utf-8"?>
 <p:sld xmlns:a="http://schemas.openxmlformats.org/drawingml/2006/main" xmlns:r="http://schemas.openxmlformats.org/officeDocument/2006/relationships" xmlns:p="http://schemas.openxmlformats.org/presentationml/2006/main">
   <p:cSld>
     <p:spTree>
@@ -15196,7 +15606,7 @@
 </p:sld>
 </file>
 
-<file path=ppt/slides/slide15.xml><?xml version="1.0" encoding="utf-8"?>
+<file path=ppt/slides/slide17.xml><?xml version="1.0" encoding="utf-8"?>
 <p:sld xmlns:a="http://schemas.openxmlformats.org/drawingml/2006/main" xmlns:r="http://schemas.openxmlformats.org/officeDocument/2006/relationships" xmlns:p="http://schemas.openxmlformats.org/presentationml/2006/main">
   <p:cSld>
     <p:spTree>
@@ -15287,7 +15697,7 @@
 </p:sld>
 </file>
 
-<file path=ppt/slides/slide16.xml><?xml version="1.0" encoding="utf-8"?>
+<file path=ppt/slides/slide18.xml><?xml version="1.0" encoding="utf-8"?>
 <p:sld xmlns:a="http://schemas.openxmlformats.org/drawingml/2006/main" xmlns:r="http://schemas.openxmlformats.org/officeDocument/2006/relationships" xmlns:p="http://schemas.openxmlformats.org/presentationml/2006/main">
   <p:cSld>
     <p:spTree>
@@ -15378,7 +15788,7 @@
 </p:sld>
 </file>
 
-<file path=ppt/slides/slide17.xml><?xml version="1.0" encoding="utf-8"?>
+<file path=ppt/slides/slide19.xml><?xml version="1.0" encoding="utf-8"?>
 <p:sld xmlns:a="http://schemas.openxmlformats.org/drawingml/2006/main" xmlns:r="http://schemas.openxmlformats.org/officeDocument/2006/relationships" xmlns:p="http://schemas.openxmlformats.org/presentationml/2006/main">
   <p:cSld>
     <p:spTree>
@@ -15465,177 +15875,6 @@
     <p:extLst>
       <p:ext uri="{BB962C8B-B14F-4D97-AF65-F5344CB8AC3E}">
         <p14:creationId xmlns:p14="http://schemas.microsoft.com/office/powerpoint/2010/main" val="1105745680"/>
-      </p:ext>
-    </p:extLst>
-  </p:cSld>
-  <p:clrMapOvr>
-    <a:masterClrMapping/>
-  </p:clrMapOvr>
-</p:sld>
-</file>
-
-<file path=ppt/slides/slide18.xml><?xml version="1.0" encoding="utf-8"?>
-<p:sld xmlns:a="http://schemas.openxmlformats.org/drawingml/2006/main" xmlns:r="http://schemas.openxmlformats.org/officeDocument/2006/relationships" xmlns:p="http://schemas.openxmlformats.org/presentationml/2006/main">
-  <p:cSld>
-    <p:spTree>
-      <p:nvGrpSpPr>
-        <p:cNvPr id="1" name=""/>
-        <p:cNvGrpSpPr/>
-        <p:nvPr/>
-      </p:nvGrpSpPr>
-      <p:grpSpPr>
-        <a:xfrm>
-          <a:off x="0" y="0"/>
-          <a:ext cx="0" cy="0"/>
-          <a:chOff x="0" y="0"/>
-          <a:chExt cx="0" cy="0"/>
-        </a:xfrm>
-      </p:grpSpPr>
-      <p:sp>
-        <p:nvSpPr>
-          <p:cNvPr id="2" name="Title 1">
-            <a:extLst>
-              <a:ext uri="{FF2B5EF4-FFF2-40B4-BE49-F238E27FC236}">
-                <a16:creationId xmlns:a16="http://schemas.microsoft.com/office/drawing/2014/main" id="{CA1440C0-BA27-4A4E-BC48-8D294E82EE46}"/>
-              </a:ext>
-            </a:extLst>
-          </p:cNvPr>
-          <p:cNvSpPr>
-            <a:spLocks noGrp="1"/>
-          </p:cNvSpPr>
-          <p:nvPr>
-            <p:ph type="title"/>
-          </p:nvPr>
-        </p:nvSpPr>
-        <p:spPr/>
-        <p:txBody>
-          <a:bodyPr/>
-          <a:lstStyle/>
-          <a:p>
-            <a:r>
-              <a:rPr lang="de-DE" dirty="0"/>
-              <a:t>Automation</a:t>
-            </a:r>
-          </a:p>
-        </p:txBody>
-      </p:sp>
-      <p:sp>
-        <p:nvSpPr>
-          <p:cNvPr id="3" name="Content Placeholder 2">
-            <a:extLst>
-              <a:ext uri="{FF2B5EF4-FFF2-40B4-BE49-F238E27FC236}">
-                <a16:creationId xmlns:a16="http://schemas.microsoft.com/office/drawing/2014/main" id="{6CE5D631-3180-4DBB-85D8-73266ECAA8D8}"/>
-              </a:ext>
-            </a:extLst>
-          </p:cNvPr>
-          <p:cNvSpPr>
-            <a:spLocks noGrp="1"/>
-          </p:cNvSpPr>
-          <p:nvPr>
-            <p:ph idx="1"/>
-          </p:nvPr>
-        </p:nvSpPr>
-        <p:spPr/>
-        <p:txBody>
-          <a:bodyPr>
-            <a:normAutofit fontScale="85000" lnSpcReduction="10000"/>
-          </a:bodyPr>
-          <a:lstStyle/>
-          <a:p>
-            <a:r>
-              <a:rPr lang="de-DE" dirty="0"/>
-              <a:t>Tests, DIE, </a:t>
-            </a:r>
-            <a:r>
-              <a:rPr lang="de-DE" dirty="0" err="1"/>
-              <a:t>git</a:t>
-            </a:r>
-            <a:r>
-              <a:rPr lang="de-DE" dirty="0"/>
-              <a:t>, </a:t>
-            </a:r>
-            <a:r>
-              <a:rPr lang="de-DE" dirty="0" err="1"/>
-              <a:t>YouTrack</a:t>
-            </a:r>
-            <a:r>
-              <a:rPr lang="de-DE" dirty="0"/>
-              <a:t> SHOW Integration</a:t>
-            </a:r>
-          </a:p>
-          <a:p>
-            <a:endParaRPr lang="de-DE" dirty="0"/>
-          </a:p>
-          <a:p>
-            <a:r>
-              <a:rPr lang="en-US" dirty="0"/>
-              <a:t>Automated testing is important, why is it important. Are you mentioning that in your talk, </a:t>
-            </a:r>
-            <a:br>
-              <a:rPr lang="en-US" dirty="0"/>
-            </a:br>
-            <a:r>
-              <a:rPr lang="en-US" dirty="0"/>
-              <a:t>are you explaining how it is integrated into your project. what does this mean for the client? </a:t>
-            </a:r>
-            <a:br>
-              <a:rPr lang="en-US" dirty="0"/>
-            </a:br>
-            <a:r>
-              <a:rPr lang="en-US" b="1" dirty="0"/>
-              <a:t>Present proof that yours are executed. </a:t>
-            </a:r>
-            <a:br>
-              <a:rPr lang="en-US" dirty="0"/>
-            </a:br>
-            <a:r>
-              <a:rPr lang="en-US" dirty="0"/>
-              <a:t>So - not only are you implementing it technically, but you are also arguing in your presentation </a:t>
-            </a:r>
-            <a:br>
-              <a:rPr lang="en-US" dirty="0"/>
-            </a:br>
-            <a:r>
-              <a:rPr lang="en-US" dirty="0"/>
-              <a:t>how it is integrated into your project management and software engineering process and </a:t>
-            </a:r>
-            <a:br>
-              <a:rPr lang="en-US" dirty="0"/>
-            </a:br>
-            <a:r>
-              <a:rPr lang="en-US" dirty="0"/>
-              <a:t>methodology of running your project. </a:t>
-            </a:r>
-            <a:br>
-              <a:rPr lang="en-US" dirty="0"/>
-            </a:br>
-            <a:r>
-              <a:rPr lang="en-US" dirty="0"/>
-              <a:t>You </a:t>
-            </a:r>
-            <a:r>
-              <a:rPr lang="en-US" dirty="0" err="1"/>
-              <a:t>dont</a:t>
-            </a:r>
-            <a:r>
-              <a:rPr lang="en-US" dirty="0"/>
-              <a:t> need to mention it 4 times, but for me I need to see whether you cover all aspects</a:t>
-            </a:r>
-            <a:br>
-              <a:rPr lang="en-US" dirty="0"/>
-            </a:br>
-            <a:r>
-              <a:rPr lang="en-US" dirty="0"/>
-              <a:t>of the testing during your talk.</a:t>
-            </a:r>
-            <a:endParaRPr lang="de-DE" dirty="0"/>
-          </a:p>
-        </p:txBody>
-      </p:sp>
-    </p:spTree>
-    <p:extLst>
-      <p:ext uri="{BB962C8B-B14F-4D97-AF65-F5344CB8AC3E}">
-        <p14:creationId xmlns:p14="http://schemas.microsoft.com/office/powerpoint/2010/main" val="3643392253"/>
       </p:ext>
     </p:extLst>
   </p:cSld>
@@ -15743,6 +15982,177 @@
 </p:sld>
 </file>
 
+<file path=ppt/slides/slide20.xml><?xml version="1.0" encoding="utf-8"?>
+<p:sld xmlns:a="http://schemas.openxmlformats.org/drawingml/2006/main" xmlns:r="http://schemas.openxmlformats.org/officeDocument/2006/relationships" xmlns:p="http://schemas.openxmlformats.org/presentationml/2006/main">
+  <p:cSld>
+    <p:spTree>
+      <p:nvGrpSpPr>
+        <p:cNvPr id="1" name=""/>
+        <p:cNvGrpSpPr/>
+        <p:nvPr/>
+      </p:nvGrpSpPr>
+      <p:grpSpPr>
+        <a:xfrm>
+          <a:off x="0" y="0"/>
+          <a:ext cx="0" cy="0"/>
+          <a:chOff x="0" y="0"/>
+          <a:chExt cx="0" cy="0"/>
+        </a:xfrm>
+      </p:grpSpPr>
+      <p:sp>
+        <p:nvSpPr>
+          <p:cNvPr id="2" name="Title 1">
+            <a:extLst>
+              <a:ext uri="{FF2B5EF4-FFF2-40B4-BE49-F238E27FC236}">
+                <a16:creationId xmlns:a16="http://schemas.microsoft.com/office/drawing/2014/main" id="{CA1440C0-BA27-4A4E-BC48-8D294E82EE46}"/>
+              </a:ext>
+            </a:extLst>
+          </p:cNvPr>
+          <p:cNvSpPr>
+            <a:spLocks noGrp="1"/>
+          </p:cNvSpPr>
+          <p:nvPr>
+            <p:ph type="title"/>
+          </p:nvPr>
+        </p:nvSpPr>
+        <p:spPr/>
+        <p:txBody>
+          <a:bodyPr/>
+          <a:lstStyle/>
+          <a:p>
+            <a:r>
+              <a:rPr lang="de-DE" dirty="0"/>
+              <a:t>Automation</a:t>
+            </a:r>
+          </a:p>
+        </p:txBody>
+      </p:sp>
+      <p:sp>
+        <p:nvSpPr>
+          <p:cNvPr id="3" name="Content Placeholder 2">
+            <a:extLst>
+              <a:ext uri="{FF2B5EF4-FFF2-40B4-BE49-F238E27FC236}">
+                <a16:creationId xmlns:a16="http://schemas.microsoft.com/office/drawing/2014/main" id="{6CE5D631-3180-4DBB-85D8-73266ECAA8D8}"/>
+              </a:ext>
+            </a:extLst>
+          </p:cNvPr>
+          <p:cNvSpPr>
+            <a:spLocks noGrp="1"/>
+          </p:cNvSpPr>
+          <p:nvPr>
+            <p:ph idx="1"/>
+          </p:nvPr>
+        </p:nvSpPr>
+        <p:spPr/>
+        <p:txBody>
+          <a:bodyPr>
+            <a:normAutofit fontScale="85000" lnSpcReduction="10000"/>
+          </a:bodyPr>
+          <a:lstStyle/>
+          <a:p>
+            <a:r>
+              <a:rPr lang="de-DE" dirty="0"/>
+              <a:t>Tests, DIE, </a:t>
+            </a:r>
+            <a:r>
+              <a:rPr lang="de-DE" dirty="0" err="1"/>
+              <a:t>git</a:t>
+            </a:r>
+            <a:r>
+              <a:rPr lang="de-DE" dirty="0"/>
+              <a:t>, </a:t>
+            </a:r>
+            <a:r>
+              <a:rPr lang="de-DE" dirty="0" err="1"/>
+              <a:t>YouTrack</a:t>
+            </a:r>
+            <a:r>
+              <a:rPr lang="de-DE" dirty="0"/>
+              <a:t> SHOW Integration</a:t>
+            </a:r>
+          </a:p>
+          <a:p>
+            <a:endParaRPr lang="de-DE" dirty="0"/>
+          </a:p>
+          <a:p>
+            <a:r>
+              <a:rPr lang="en-US" dirty="0"/>
+              <a:t>Automated testing is important, why is it important. Are you mentioning that in your talk, </a:t>
+            </a:r>
+            <a:br>
+              <a:rPr lang="en-US" dirty="0"/>
+            </a:br>
+            <a:r>
+              <a:rPr lang="en-US" dirty="0"/>
+              <a:t>are you explaining how it is integrated into your project. what does this mean for the client? </a:t>
+            </a:r>
+            <a:br>
+              <a:rPr lang="en-US" dirty="0"/>
+            </a:br>
+            <a:r>
+              <a:rPr lang="en-US" b="1" dirty="0"/>
+              <a:t>Present proof that yours are executed. </a:t>
+            </a:r>
+            <a:br>
+              <a:rPr lang="en-US" dirty="0"/>
+            </a:br>
+            <a:r>
+              <a:rPr lang="en-US" dirty="0"/>
+              <a:t>So - not only are you implementing it technically, but you are also arguing in your presentation </a:t>
+            </a:r>
+            <a:br>
+              <a:rPr lang="en-US" dirty="0"/>
+            </a:br>
+            <a:r>
+              <a:rPr lang="en-US" dirty="0"/>
+              <a:t>how it is integrated into your project management and software engineering process and </a:t>
+            </a:r>
+            <a:br>
+              <a:rPr lang="en-US" dirty="0"/>
+            </a:br>
+            <a:r>
+              <a:rPr lang="en-US" dirty="0"/>
+              <a:t>methodology of running your project. </a:t>
+            </a:r>
+            <a:br>
+              <a:rPr lang="en-US" dirty="0"/>
+            </a:br>
+            <a:r>
+              <a:rPr lang="en-US" dirty="0"/>
+              <a:t>You </a:t>
+            </a:r>
+            <a:r>
+              <a:rPr lang="en-US" dirty="0" err="1"/>
+              <a:t>dont</a:t>
+            </a:r>
+            <a:r>
+              <a:rPr lang="en-US" dirty="0"/>
+              <a:t> need to mention it 4 times, but for me I need to see whether you cover all aspects</a:t>
+            </a:r>
+            <a:br>
+              <a:rPr lang="en-US" dirty="0"/>
+            </a:br>
+            <a:r>
+              <a:rPr lang="en-US" dirty="0"/>
+              <a:t>of the testing during your talk.</a:t>
+            </a:r>
+            <a:endParaRPr lang="de-DE" dirty="0"/>
+          </a:p>
+        </p:txBody>
+      </p:sp>
+    </p:spTree>
+    <p:extLst>
+      <p:ext uri="{BB962C8B-B14F-4D97-AF65-F5344CB8AC3E}">
+        <p14:creationId xmlns:p14="http://schemas.microsoft.com/office/powerpoint/2010/main" val="3643392253"/>
+      </p:ext>
+    </p:extLst>
+  </p:cSld>
+  <p:clrMapOvr>
+    <a:masterClrMapping/>
+  </p:clrMapOvr>
+</p:sld>
+</file>
+
 <file path=ppt/slides/slide3.xml><?xml version="1.0" encoding="utf-8"?>
 <p:sld xmlns:a="http://schemas.openxmlformats.org/drawingml/2006/main" xmlns:r="http://schemas.openxmlformats.org/officeDocument/2006/relationships" xmlns:p="http://schemas.openxmlformats.org/presentationml/2006/main">
   <p:cSld>
@@ -15782,8 +16192,12 @@
           <a:lstStyle/>
           <a:p>
             <a:r>
+              <a:rPr lang="de-DE" dirty="0" err="1"/>
+              <a:t>Our</a:t>
+            </a:r>
+            <a:r>
               <a:rPr lang="de-DE" dirty="0"/>
-              <a:t>Vision</a:t>
+              <a:t> Vision</a:t>
             </a:r>
           </a:p>
         </p:txBody>
@@ -15809,24 +16223,18 @@
           <a:bodyPr/>
           <a:lstStyle/>
           <a:p>
-            <a:endParaRPr lang="en-US" dirty="0"/>
-          </a:p>
-          <a:p>
-            <a:r>
-              <a:rPr lang="en-US" dirty="0"/>
+            <a:r>
+              <a:rPr lang="en-US" sz="2400" b="1" dirty="0"/>
+              <a:t>Blow up your motivation levels for reaching your goals!</a:t>
+            </a:r>
+          </a:p>
+          <a:p>
+            <a:endParaRPr lang="en-US" sz="2400" b="1" dirty="0"/>
+          </a:p>
+          <a:p>
+            <a:r>
+              <a:rPr lang="en-US" sz="2400" b="1" dirty="0"/>
               <a:t>Turn mundane tasks such as studying into a game!</a:t>
-            </a:r>
-          </a:p>
-          <a:p>
-            <a:r>
-              <a:rPr lang="en-US" dirty="0"/>
-              <a:t>Applying the concepts of gamification to your studies and tasks in a way no one ever has! </a:t>
-            </a:r>
-          </a:p>
-          <a:p>
-            <a:r>
-              <a:rPr lang="en-US" dirty="0"/>
-              <a:t>Get points for the completion of tasks and spend them on personal rewards</a:t>
             </a:r>
           </a:p>
           <a:p>
@@ -15848,6 +16256,507 @@
 </file>
 
 <file path=ppt/slides/slide4.xml><?xml version="1.0" encoding="utf-8"?>
+<p:sld xmlns:a="http://schemas.openxmlformats.org/drawingml/2006/main" xmlns:r="http://schemas.openxmlformats.org/officeDocument/2006/relationships" xmlns:p="http://schemas.openxmlformats.org/presentationml/2006/main">
+  <p:cSld>
+    <p:spTree>
+      <p:nvGrpSpPr>
+        <p:cNvPr id="1" name=""/>
+        <p:cNvGrpSpPr/>
+        <p:nvPr/>
+      </p:nvGrpSpPr>
+      <p:grpSpPr>
+        <a:xfrm>
+          <a:off x="0" y="0"/>
+          <a:ext cx="0" cy="0"/>
+          <a:chOff x="0" y="0"/>
+          <a:chExt cx="0" cy="0"/>
+        </a:xfrm>
+      </p:grpSpPr>
+      <p:sp>
+        <p:nvSpPr>
+          <p:cNvPr id="2" name="Title 1">
+            <a:extLst>
+              <a:ext uri="{FF2B5EF4-FFF2-40B4-BE49-F238E27FC236}">
+                <a16:creationId xmlns:a16="http://schemas.microsoft.com/office/drawing/2014/main" id="{49D27BEB-2C2D-400B-BC08-907B62CBF066}"/>
+              </a:ext>
+            </a:extLst>
+          </p:cNvPr>
+          <p:cNvSpPr>
+            <a:spLocks noGrp="1"/>
+          </p:cNvSpPr>
+          <p:nvPr>
+            <p:ph type="title"/>
+          </p:nvPr>
+        </p:nvSpPr>
+        <p:spPr/>
+        <p:txBody>
+          <a:bodyPr/>
+          <a:lstStyle/>
+          <a:p>
+            <a:r>
+              <a:rPr lang="de-DE" dirty="0"/>
+              <a:t>Vision - Mission</a:t>
+            </a:r>
+          </a:p>
+        </p:txBody>
+      </p:sp>
+      <p:sp>
+        <p:nvSpPr>
+          <p:cNvPr id="3" name="Content Placeholder 2">
+            <a:extLst>
+              <a:ext uri="{FF2B5EF4-FFF2-40B4-BE49-F238E27FC236}">
+                <a16:creationId xmlns:a16="http://schemas.microsoft.com/office/drawing/2014/main" id="{02113537-1C9F-4BB5-8392-7FC7C1917027}"/>
+              </a:ext>
+            </a:extLst>
+          </p:cNvPr>
+          <p:cNvSpPr>
+            <a:spLocks noGrp="1"/>
+          </p:cNvSpPr>
+          <p:nvPr>
+            <p:ph idx="1"/>
+          </p:nvPr>
+        </p:nvSpPr>
+        <p:spPr/>
+        <p:txBody>
+          <a:bodyPr/>
+          <a:lstStyle/>
+          <a:p>
+            <a:r>
+              <a:rPr lang="de-DE" dirty="0" err="1"/>
+              <a:t>You</a:t>
+            </a:r>
+            <a:r>
+              <a:rPr lang="de-DE" dirty="0"/>
+              <a:t> </a:t>
+            </a:r>
+            <a:r>
+              <a:rPr lang="de-DE" dirty="0" err="1"/>
+              <a:t>can</a:t>
+            </a:r>
+            <a:r>
+              <a:rPr lang="de-DE" dirty="0"/>
+              <a:t> </a:t>
+            </a:r>
+            <a:r>
+              <a:rPr lang="de-DE" dirty="0" err="1"/>
+              <a:t>create</a:t>
+            </a:r>
+            <a:r>
+              <a:rPr lang="de-DE" dirty="0"/>
+              <a:t> </a:t>
+            </a:r>
+            <a:r>
+              <a:rPr lang="de-DE" dirty="0" err="1"/>
+              <a:t>your</a:t>
+            </a:r>
+            <a:r>
+              <a:rPr lang="de-DE" dirty="0"/>
+              <a:t> </a:t>
+            </a:r>
+            <a:r>
+              <a:rPr lang="de-DE" dirty="0" err="1"/>
+              <a:t>own</a:t>
+            </a:r>
+            <a:r>
+              <a:rPr lang="de-DE" dirty="0"/>
+              <a:t> </a:t>
+            </a:r>
+            <a:r>
+              <a:rPr lang="de-DE" b="1" dirty="0" err="1"/>
+              <a:t>mission</a:t>
+            </a:r>
+            <a:endParaRPr lang="de-DE" b="1" dirty="0"/>
+          </a:p>
+          <a:p>
+            <a:pPr lvl="1"/>
+            <a:r>
+              <a:rPr lang="de-DE" dirty="0" err="1"/>
+              <a:t>Consists</a:t>
+            </a:r>
+            <a:r>
+              <a:rPr lang="de-DE" dirty="0"/>
+              <a:t> </a:t>
+            </a:r>
+            <a:r>
+              <a:rPr lang="de-DE" dirty="0" err="1"/>
+              <a:t>of</a:t>
+            </a:r>
+            <a:r>
+              <a:rPr lang="de-DE" dirty="0"/>
+              <a:t> </a:t>
+            </a:r>
+            <a:r>
+              <a:rPr lang="de-DE" b="1" dirty="0" err="1"/>
+              <a:t>tasks</a:t>
+            </a:r>
+            <a:endParaRPr lang="de-DE" b="1" dirty="0"/>
+          </a:p>
+          <a:p>
+            <a:pPr lvl="1"/>
+            <a:endParaRPr lang="de-DE" b="1" dirty="0"/>
+          </a:p>
+          <a:p>
+            <a:r>
+              <a:rPr lang="de-DE" dirty="0"/>
+              <a:t>Definition </a:t>
+            </a:r>
+            <a:r>
+              <a:rPr lang="de-DE" dirty="0" err="1"/>
+              <a:t>of</a:t>
+            </a:r>
+            <a:r>
+              <a:rPr lang="de-DE" dirty="0"/>
+              <a:t> a „Mission“ </a:t>
+            </a:r>
+            <a:r>
+              <a:rPr lang="de-DE" dirty="0" err="1"/>
+              <a:t>is</a:t>
+            </a:r>
+            <a:r>
+              <a:rPr lang="de-DE" dirty="0"/>
+              <a:t> </a:t>
+            </a:r>
+            <a:r>
+              <a:rPr lang="de-DE" dirty="0" err="1"/>
+              <a:t>up</a:t>
+            </a:r>
+            <a:r>
+              <a:rPr lang="de-DE" dirty="0"/>
+              <a:t> </a:t>
+            </a:r>
+            <a:r>
+              <a:rPr lang="de-DE" dirty="0" err="1"/>
+              <a:t>to</a:t>
+            </a:r>
+            <a:r>
+              <a:rPr lang="de-DE" dirty="0"/>
+              <a:t> </a:t>
+            </a:r>
+            <a:r>
+              <a:rPr lang="de-DE" dirty="0" err="1"/>
+              <a:t>you</a:t>
+            </a:r>
+            <a:r>
+              <a:rPr lang="de-DE" dirty="0"/>
+              <a:t>!!</a:t>
+            </a:r>
+          </a:p>
+        </p:txBody>
+      </p:sp>
+    </p:spTree>
+    <p:extLst>
+      <p:ext uri="{BB962C8B-B14F-4D97-AF65-F5344CB8AC3E}">
+        <p14:creationId xmlns:p14="http://schemas.microsoft.com/office/powerpoint/2010/main" val="3872291973"/>
+      </p:ext>
+    </p:extLst>
+  </p:cSld>
+  <p:clrMapOvr>
+    <a:masterClrMapping/>
+  </p:clrMapOvr>
+</p:sld>
+</file>
+
+<file path=ppt/slides/slide5.xml><?xml version="1.0" encoding="utf-8"?>
+<p:sld xmlns:a="http://schemas.openxmlformats.org/drawingml/2006/main" xmlns:r="http://schemas.openxmlformats.org/officeDocument/2006/relationships" xmlns:p="http://schemas.openxmlformats.org/presentationml/2006/main">
+  <p:cSld>
+    <p:spTree>
+      <p:nvGrpSpPr>
+        <p:cNvPr id="1" name=""/>
+        <p:cNvGrpSpPr/>
+        <p:nvPr/>
+      </p:nvGrpSpPr>
+      <p:grpSpPr>
+        <a:xfrm>
+          <a:off x="0" y="0"/>
+          <a:ext cx="0" cy="0"/>
+          <a:chOff x="0" y="0"/>
+          <a:chExt cx="0" cy="0"/>
+        </a:xfrm>
+      </p:grpSpPr>
+      <p:sp>
+        <p:nvSpPr>
+          <p:cNvPr id="2" name="Title 1">
+            <a:extLst>
+              <a:ext uri="{FF2B5EF4-FFF2-40B4-BE49-F238E27FC236}">
+                <a16:creationId xmlns:a16="http://schemas.microsoft.com/office/drawing/2014/main" id="{0FA30728-EB32-409F-AA34-5F018C28C31B}"/>
+              </a:ext>
+            </a:extLst>
+          </p:cNvPr>
+          <p:cNvSpPr>
+            <a:spLocks noGrp="1"/>
+          </p:cNvSpPr>
+          <p:nvPr>
+            <p:ph type="title"/>
+          </p:nvPr>
+        </p:nvSpPr>
+        <p:spPr/>
+        <p:txBody>
+          <a:bodyPr/>
+          <a:lstStyle/>
+          <a:p>
+            <a:r>
+              <a:rPr lang="de-DE" dirty="0"/>
+              <a:t>Vision - Motivation</a:t>
+            </a:r>
+          </a:p>
+        </p:txBody>
+      </p:sp>
+      <p:sp>
+        <p:nvSpPr>
+          <p:cNvPr id="4" name="Text Placeholder 3">
+            <a:extLst>
+              <a:ext uri="{FF2B5EF4-FFF2-40B4-BE49-F238E27FC236}">
+                <a16:creationId xmlns:a16="http://schemas.microsoft.com/office/drawing/2014/main" id="{2FBD1086-A9C1-4770-8595-D949D35C3EA1}"/>
+              </a:ext>
+            </a:extLst>
+          </p:cNvPr>
+          <p:cNvSpPr>
+            <a:spLocks noGrp="1"/>
+          </p:cNvSpPr>
+          <p:nvPr>
+            <p:ph type="body" idx="1"/>
+          </p:nvPr>
+        </p:nvSpPr>
+        <p:spPr/>
+        <p:txBody>
+          <a:bodyPr/>
+          <a:lstStyle/>
+          <a:p>
+            <a:r>
+              <a:rPr lang="de-DE" u="sng" dirty="0" err="1"/>
+              <a:t>Competitive</a:t>
+            </a:r>
+            <a:endParaRPr lang="de-DE" u="sng" dirty="0"/>
+          </a:p>
+        </p:txBody>
+      </p:sp>
+      <p:sp>
+        <p:nvSpPr>
+          <p:cNvPr id="5" name="Content Placeholder 4">
+            <a:extLst>
+              <a:ext uri="{FF2B5EF4-FFF2-40B4-BE49-F238E27FC236}">
+                <a16:creationId xmlns:a16="http://schemas.microsoft.com/office/drawing/2014/main" id="{A6C326F7-34B7-4588-AF1E-2B387B8C68AD}"/>
+              </a:ext>
+            </a:extLst>
+          </p:cNvPr>
+          <p:cNvSpPr>
+            <a:spLocks noGrp="1"/>
+          </p:cNvSpPr>
+          <p:nvPr>
+            <p:ph sz="half" idx="2"/>
+          </p:nvPr>
+        </p:nvSpPr>
+        <p:spPr/>
+        <p:txBody>
+          <a:bodyPr/>
+          <a:lstStyle/>
+          <a:p>
+            <a:endParaRPr lang="de-DE" dirty="0"/>
+          </a:p>
+          <a:p>
+            <a:r>
+              <a:rPr lang="de-DE" dirty="0"/>
+              <a:t>Points </a:t>
+            </a:r>
+            <a:r>
+              <a:rPr lang="de-DE" dirty="0" err="1"/>
+              <a:t>for</a:t>
+            </a:r>
+            <a:r>
+              <a:rPr lang="de-DE" dirty="0"/>
+              <a:t> </a:t>
+            </a:r>
+            <a:r>
+              <a:rPr lang="de-DE" dirty="0" err="1"/>
+              <a:t>completing</a:t>
+            </a:r>
+            <a:r>
+              <a:rPr lang="de-DE" dirty="0"/>
+              <a:t> </a:t>
+            </a:r>
+            <a:r>
+              <a:rPr lang="de-DE" dirty="0" err="1"/>
+              <a:t>tasks</a:t>
+            </a:r>
+            <a:endParaRPr lang="de-DE" dirty="0"/>
+          </a:p>
+          <a:p>
+            <a:r>
+              <a:rPr lang="de-DE" dirty="0" err="1"/>
+              <a:t>Highscore</a:t>
+            </a:r>
+            <a:r>
+              <a:rPr lang="de-DE" dirty="0"/>
+              <a:t> </a:t>
+            </a:r>
+            <a:r>
+              <a:rPr lang="de-DE" dirty="0" err="1"/>
+              <a:t>system</a:t>
+            </a:r>
+            <a:endParaRPr lang="de-DE" dirty="0"/>
+          </a:p>
+          <a:p>
+            <a:r>
+              <a:rPr lang="de-DE" dirty="0"/>
+              <a:t>Group </a:t>
+            </a:r>
+            <a:r>
+              <a:rPr lang="de-DE" dirty="0" err="1"/>
+              <a:t>statistics</a:t>
+            </a:r>
+            <a:endParaRPr lang="de-DE" dirty="0"/>
+          </a:p>
+          <a:p>
+            <a:r>
+              <a:rPr lang="de-DE" dirty="0"/>
+              <a:t>Push </a:t>
+            </a:r>
+            <a:r>
+              <a:rPr lang="de-DE" dirty="0" err="1"/>
+              <a:t>notification</a:t>
+            </a:r>
+            <a:endParaRPr lang="de-DE" dirty="0"/>
+          </a:p>
+          <a:p>
+            <a:endParaRPr lang="de-DE" dirty="0"/>
+          </a:p>
+        </p:txBody>
+      </p:sp>
+      <p:sp>
+        <p:nvSpPr>
+          <p:cNvPr id="6" name="Text Placeholder 5">
+            <a:extLst>
+              <a:ext uri="{FF2B5EF4-FFF2-40B4-BE49-F238E27FC236}">
+                <a16:creationId xmlns:a16="http://schemas.microsoft.com/office/drawing/2014/main" id="{7AC0920D-B5CF-445C-AB50-D535177985B6}"/>
+              </a:ext>
+            </a:extLst>
+          </p:cNvPr>
+          <p:cNvSpPr>
+            <a:spLocks noGrp="1"/>
+          </p:cNvSpPr>
+          <p:nvPr>
+            <p:ph type="body" sz="quarter" idx="3"/>
+          </p:nvPr>
+        </p:nvSpPr>
+        <p:spPr/>
+        <p:txBody>
+          <a:bodyPr/>
+          <a:lstStyle/>
+          <a:p>
+            <a:r>
+              <a:rPr lang="de-DE" u="sng" dirty="0" err="1"/>
+              <a:t>Self-reflection</a:t>
+            </a:r>
+            <a:endParaRPr lang="de-DE" u="sng" dirty="0"/>
+          </a:p>
+        </p:txBody>
+      </p:sp>
+      <p:sp>
+        <p:nvSpPr>
+          <p:cNvPr id="7" name="Content Placeholder 6">
+            <a:extLst>
+              <a:ext uri="{FF2B5EF4-FFF2-40B4-BE49-F238E27FC236}">
+                <a16:creationId xmlns:a16="http://schemas.microsoft.com/office/drawing/2014/main" id="{F1E8DF26-05A8-49B0-A800-59E4FCFB4339}"/>
+              </a:ext>
+            </a:extLst>
+          </p:cNvPr>
+          <p:cNvSpPr>
+            <a:spLocks noGrp="1"/>
+          </p:cNvSpPr>
+          <p:nvPr>
+            <p:ph sz="quarter" idx="4"/>
+          </p:nvPr>
+        </p:nvSpPr>
+        <p:spPr/>
+        <p:txBody>
+          <a:bodyPr/>
+          <a:lstStyle/>
+          <a:p>
+            <a:endParaRPr lang="de-DE" dirty="0"/>
+          </a:p>
+          <a:p>
+            <a:r>
+              <a:rPr lang="de-DE" dirty="0"/>
+              <a:t>Individual </a:t>
+            </a:r>
+            <a:r>
+              <a:rPr lang="de-DE" dirty="0" err="1"/>
+              <a:t>rating</a:t>
+            </a:r>
+            <a:r>
+              <a:rPr lang="de-DE" dirty="0"/>
+              <a:t> </a:t>
+            </a:r>
+            <a:r>
+              <a:rPr lang="de-DE" dirty="0" err="1"/>
+              <a:t>of</a:t>
+            </a:r>
+            <a:r>
+              <a:rPr lang="de-DE" dirty="0"/>
+              <a:t> (</a:t>
+            </a:r>
+            <a:r>
+              <a:rPr lang="de-DE" dirty="0" err="1"/>
+              <a:t>completed</a:t>
+            </a:r>
+            <a:r>
+              <a:rPr lang="de-DE" dirty="0"/>
+              <a:t>) </a:t>
+            </a:r>
+            <a:r>
+              <a:rPr lang="de-DE" dirty="0" err="1"/>
+              <a:t>tasks</a:t>
+            </a:r>
+            <a:endParaRPr lang="de-DE" dirty="0"/>
+          </a:p>
+          <a:p>
+            <a:r>
+              <a:rPr lang="de-DE" dirty="0" err="1"/>
+              <a:t>Reward</a:t>
+            </a:r>
+            <a:r>
+              <a:rPr lang="de-DE" dirty="0"/>
+              <a:t> </a:t>
+            </a:r>
+            <a:r>
+              <a:rPr lang="de-DE" dirty="0" err="1"/>
+              <a:t>system</a:t>
+            </a:r>
+            <a:r>
+              <a:rPr lang="de-DE" dirty="0"/>
+              <a:t> outside </a:t>
+            </a:r>
+            <a:r>
+              <a:rPr lang="de-DE" dirty="0" err="1"/>
+              <a:t>groups</a:t>
+            </a:r>
+            <a:endParaRPr lang="de-DE" dirty="0"/>
+          </a:p>
+          <a:p>
+            <a:r>
+              <a:rPr lang="en-US" dirty="0"/>
+              <a:t>Spend points on personal rewards</a:t>
+            </a:r>
+          </a:p>
+          <a:p>
+            <a:endParaRPr lang="de-DE" dirty="0"/>
+          </a:p>
+        </p:txBody>
+      </p:sp>
+    </p:spTree>
+    <p:extLst>
+      <p:ext uri="{BB962C8B-B14F-4D97-AF65-F5344CB8AC3E}">
+        <p14:creationId xmlns:p14="http://schemas.microsoft.com/office/powerpoint/2010/main" val="734791144"/>
+      </p:ext>
+    </p:extLst>
+  </p:cSld>
+  <p:clrMapOvr>
+    <a:masterClrMapping/>
+  </p:clrMapOvr>
+</p:sld>
+</file>
+
+<file path=ppt/slides/slide6.xml><?xml version="1.0" encoding="utf-8"?>
 <p:sld xmlns:a="http://schemas.openxmlformats.org/drawingml/2006/main" xmlns:r="http://schemas.openxmlformats.org/officeDocument/2006/relationships" xmlns:p="http://schemas.openxmlformats.org/presentationml/2006/main">
   <p:cSld>
     <p:spTree>
@@ -16146,7 +17055,7 @@
 </p:sld>
 </file>
 
-<file path=ppt/slides/slide5.xml><?xml version="1.0" encoding="utf-8"?>
+<file path=ppt/slides/slide7.xml><?xml version="1.0" encoding="utf-8"?>
 <p:sld xmlns:a="http://schemas.openxmlformats.org/drawingml/2006/main" xmlns:r="http://schemas.openxmlformats.org/officeDocument/2006/relationships" xmlns:p="http://schemas.openxmlformats.org/presentationml/2006/main">
   <p:cSld>
     <p:spTree>
@@ -16271,7 +17180,7 @@
 </p:sld>
 </file>
 
-<file path=ppt/slides/slide6.xml><?xml version="1.0" encoding="utf-8"?>
+<file path=ppt/slides/slide8.xml><?xml version="1.0" encoding="utf-8"?>
 <p:sld xmlns:a="http://schemas.openxmlformats.org/drawingml/2006/main" xmlns:r="http://schemas.openxmlformats.org/officeDocument/2006/relationships" xmlns:p="http://schemas.openxmlformats.org/presentationml/2006/main">
   <p:cSld>
     <p:spTree>
@@ -16354,7 +17263,7 @@
 </p:sld>
 </file>
 
-<file path=ppt/slides/slide7.xml><?xml version="1.0" encoding="utf-8"?>
+<file path=ppt/slides/slide9.xml><?xml version="1.0" encoding="utf-8"?>
 <p:sld xmlns:a="http://schemas.openxmlformats.org/drawingml/2006/main" xmlns:r="http://schemas.openxmlformats.org/officeDocument/2006/relationships" xmlns:p="http://schemas.openxmlformats.org/presentationml/2006/main">
   <p:cSld>
     <p:spTree>
@@ -16432,193 +17341,6 @@
     <p:extLst>
       <p:ext uri="{BB962C8B-B14F-4D97-AF65-F5344CB8AC3E}">
         <p14:creationId xmlns:p14="http://schemas.microsoft.com/office/powerpoint/2010/main" val="1641111275"/>
-      </p:ext>
-    </p:extLst>
-  </p:cSld>
-  <p:clrMapOvr>
-    <a:masterClrMapping/>
-  </p:clrMapOvr>
-</p:sld>
-</file>
-
-<file path=ppt/slides/slide8.xml><?xml version="1.0" encoding="utf-8"?>
-<p:sld xmlns:a="http://schemas.openxmlformats.org/drawingml/2006/main" xmlns:r="http://schemas.openxmlformats.org/officeDocument/2006/relationships" xmlns:p="http://schemas.openxmlformats.org/presentationml/2006/main">
-  <p:cSld>
-    <p:spTree>
-      <p:nvGrpSpPr>
-        <p:cNvPr id="1" name=""/>
-        <p:cNvGrpSpPr/>
-        <p:nvPr/>
-      </p:nvGrpSpPr>
-      <p:grpSpPr>
-        <a:xfrm>
-          <a:off x="0" y="0"/>
-          <a:ext cx="0" cy="0"/>
-          <a:chOff x="0" y="0"/>
-          <a:chExt cx="0" cy="0"/>
-        </a:xfrm>
-      </p:grpSpPr>
-      <p:sp>
-        <p:nvSpPr>
-          <p:cNvPr id="2" name="Title 1">
-            <a:extLst>
-              <a:ext uri="{FF2B5EF4-FFF2-40B4-BE49-F238E27FC236}">
-                <a16:creationId xmlns:a16="http://schemas.microsoft.com/office/drawing/2014/main" id="{23769D50-5763-43A5-B494-F013FE7B7748}"/>
-              </a:ext>
-            </a:extLst>
-          </p:cNvPr>
-          <p:cNvSpPr>
-            <a:spLocks noGrp="1"/>
-          </p:cNvSpPr>
-          <p:nvPr>
-            <p:ph type="title"/>
-          </p:nvPr>
-        </p:nvSpPr>
-        <p:spPr/>
-        <p:txBody>
-          <a:bodyPr/>
-          <a:lstStyle/>
-          <a:p>
-            <a:r>
-              <a:rPr lang="de-DE" dirty="0" err="1"/>
-              <a:t>Burndown</a:t>
-            </a:r>
-            <a:endParaRPr lang="de-DE" dirty="0"/>
-          </a:p>
-        </p:txBody>
-      </p:sp>
-      <p:pic>
-        <p:nvPicPr>
-          <p:cNvPr id="5" name="Content Placeholder 4">
-            <a:extLst>
-              <a:ext uri="{FF2B5EF4-FFF2-40B4-BE49-F238E27FC236}">
-                <a16:creationId xmlns:a16="http://schemas.microsoft.com/office/drawing/2014/main" id="{DE29F729-B37F-4413-B337-336B4F66902C}"/>
-              </a:ext>
-            </a:extLst>
-          </p:cNvPr>
-          <p:cNvPicPr>
-            <a:picLocks noGrp="1" noChangeAspect="1"/>
-          </p:cNvPicPr>
-          <p:nvPr>
-            <p:ph idx="1"/>
-          </p:nvPr>
-        </p:nvPicPr>
-        <p:blipFill>
-          <a:blip r:embed="rId2"/>
-          <a:stretch>
-            <a:fillRect/>
-          </a:stretch>
-        </p:blipFill>
-        <p:spPr>
-          <a:xfrm>
-            <a:off x="1154953" y="1680631"/>
-            <a:ext cx="9243915" cy="5178897"/>
-          </a:xfrm>
-        </p:spPr>
-      </p:pic>
-    </p:spTree>
-    <p:extLst>
-      <p:ext uri="{BB962C8B-B14F-4D97-AF65-F5344CB8AC3E}">
-        <p14:creationId xmlns:p14="http://schemas.microsoft.com/office/powerpoint/2010/main" val="3198243135"/>
-      </p:ext>
-    </p:extLst>
-  </p:cSld>
-  <p:clrMapOvr>
-    <a:masterClrMapping/>
-  </p:clrMapOvr>
-</p:sld>
-</file>
-
-<file path=ppt/slides/slide9.xml><?xml version="1.0" encoding="utf-8"?>
-<p:sld xmlns:a="http://schemas.openxmlformats.org/drawingml/2006/main" xmlns:r="http://schemas.openxmlformats.org/officeDocument/2006/relationships" xmlns:p="http://schemas.openxmlformats.org/presentationml/2006/main">
-  <p:cSld>
-    <p:spTree>
-      <p:nvGrpSpPr>
-        <p:cNvPr id="1" name=""/>
-        <p:cNvGrpSpPr/>
-        <p:nvPr/>
-      </p:nvGrpSpPr>
-      <p:grpSpPr>
-        <a:xfrm>
-          <a:off x="0" y="0"/>
-          <a:ext cx="0" cy="0"/>
-          <a:chOff x="0" y="0"/>
-          <a:chExt cx="0" cy="0"/>
-        </a:xfrm>
-      </p:grpSpPr>
-      <p:sp>
-        <p:nvSpPr>
-          <p:cNvPr id="4" name="Title 3">
-            <a:extLst>
-              <a:ext uri="{FF2B5EF4-FFF2-40B4-BE49-F238E27FC236}">
-                <a16:creationId xmlns:a16="http://schemas.microsoft.com/office/drawing/2014/main" id="{08744978-66D0-4598-89FC-6E1D65C735E0}"/>
-              </a:ext>
-            </a:extLst>
-          </p:cNvPr>
-          <p:cNvSpPr>
-            <a:spLocks noGrp="1"/>
-          </p:cNvSpPr>
-          <p:nvPr>
-            <p:ph type="title"/>
-          </p:nvPr>
-        </p:nvSpPr>
-        <p:spPr/>
-        <p:txBody>
-          <a:bodyPr/>
-          <a:lstStyle/>
-          <a:p>
-            <a:r>
-              <a:rPr lang="de-DE" dirty="0"/>
-              <a:t>Technology</a:t>
-            </a:r>
-          </a:p>
-        </p:txBody>
-      </p:sp>
-      <p:sp>
-        <p:nvSpPr>
-          <p:cNvPr id="5" name="Text Placeholder 4">
-            <a:extLst>
-              <a:ext uri="{FF2B5EF4-FFF2-40B4-BE49-F238E27FC236}">
-                <a16:creationId xmlns:a16="http://schemas.microsoft.com/office/drawing/2014/main" id="{B17FA400-1047-4336-B54C-30AAE443EB3C}"/>
-              </a:ext>
-            </a:extLst>
-          </p:cNvPr>
-          <p:cNvSpPr>
-            <a:spLocks noGrp="1"/>
-          </p:cNvSpPr>
-          <p:nvPr>
-            <p:ph type="body" idx="1"/>
-          </p:nvPr>
-        </p:nvSpPr>
-        <p:spPr/>
-        <p:txBody>
-          <a:bodyPr/>
-          <a:lstStyle/>
-          <a:p>
-            <a:r>
-              <a:rPr lang="de-DE" dirty="0"/>
-              <a:t>Class </a:t>
-            </a:r>
-            <a:r>
-              <a:rPr lang="de-DE" dirty="0" err="1"/>
-              <a:t>diagram</a:t>
-            </a:r>
-            <a:r>
-              <a:rPr lang="de-DE" dirty="0"/>
-              <a:t>, live </a:t>
-            </a:r>
-            <a:r>
-              <a:rPr lang="de-DE" dirty="0" err="1"/>
-              <a:t>demo</a:t>
-            </a:r>
-            <a:endParaRPr lang="de-DE" dirty="0"/>
-          </a:p>
-        </p:txBody>
-      </p:sp>
-    </p:spTree>
-    <p:extLst>
-      <p:ext uri="{BB962C8B-B14F-4D97-AF65-F5344CB8AC3E}">
-        <p14:creationId xmlns:p14="http://schemas.microsoft.com/office/powerpoint/2010/main" val="3881915204"/>
       </p:ext>
     </p:extLst>
   </p:cSld>

</xml_diff>